<commit_message>
Add list comprehension materials
</commit_message>
<xml_diff>
--- a/2018/python/day2-review.pptx
+++ b/2018/python/day2-review.pptx
@@ -5,7 +5,7 @@
     <p:sldMasterId id="2147483648" r:id="rId1"/>
   </p:sldMasterIdLst>
   <p:notesMasterIdLst>
-    <p:notesMasterId r:id="rId12"/>
+    <p:notesMasterId r:id="rId13"/>
   </p:notesMasterIdLst>
   <p:sldIdLst>
     <p:sldId id="257" r:id="rId2"/>
@@ -18,6 +18,7 @@
     <p:sldId id="277" r:id="rId9"/>
     <p:sldId id="271" r:id="rId10"/>
     <p:sldId id="272" r:id="rId11"/>
+    <p:sldId id="278" r:id="rId12"/>
   </p:sldIdLst>
   <p:sldSz cx="9144000" cy="6858000" type="screen4x3"/>
   <p:notesSz cx="6858000" cy="9144000"/>
@@ -118,7 +119,7 @@
   </p:defaultTextStyle>
   <p:extLst>
     <p:ext uri="{EFAFB233-063F-42B5-8137-9DF3F51BA10A}">
-      <p15:sldGuideLst xmlns:p15="http://schemas.microsoft.com/office/powerpoint/2012/main" xmlns="">
+      <p15:sldGuideLst xmlns="" xmlns:p15="http://schemas.microsoft.com/office/powerpoint/2012/main">
         <p15:guide id="1" orient="horz" pos="2160">
           <p15:clr>
             <a:srgbClr val="A4A3A4"/>
@@ -217,7 +218,7 @@
           <a:p>
             <a:fld id="{91BDCAE1-DC13-3545-841A-A4DBCAED93AF}" type="datetimeFigureOut">
               <a:rPr lang="en-US" smtClean="0"/>
-              <a:t>6/7/17</a:t>
+              <a:t>5/30/18</a:t>
             </a:fld>
             <a:endParaRPr lang="en-US"/>
           </a:p>
@@ -717,7 +718,7 @@
 </p:notes>
 </file>
 
-<file path=ppt/notesSlides/notesSlide2.xml><?xml version="1.0" encoding="utf-8"?>
+<file path=ppt/notesSlides/notesSlide11.xml><?xml version="1.0" encoding="utf-8"?>
 <p:notes xmlns:a="http://schemas.openxmlformats.org/drawingml/2006/main" xmlns:r="http://schemas.openxmlformats.org/officeDocument/2006/relationships" xmlns:p="http://schemas.openxmlformats.org/presentationml/2006/main" showMasterSp="0" showMasterPhAnim="0">
   <p:cSld>
     <p:spTree>
@@ -823,7 +824,7 @@
     </p:spTree>
     <p:extLst>
       <p:ext uri="{BB962C8B-B14F-4D97-AF65-F5344CB8AC3E}">
-        <p14:creationId xmlns:p14="http://schemas.microsoft.com/office/powerpoint/2010/main" val="1753150728"/>
+        <p14:creationId xmlns:p14="http://schemas.microsoft.com/office/powerpoint/2010/main" val="2384900118"/>
       </p:ext>
     </p:extLst>
   </p:cSld>
@@ -833,7 +834,7 @@
 </p:notes>
 </file>
 
-<file path=ppt/notesSlides/notesSlide3.xml><?xml version="1.0" encoding="utf-8"?>
+<file path=ppt/notesSlides/notesSlide2.xml><?xml version="1.0" encoding="utf-8"?>
 <p:notes xmlns:a="http://schemas.openxmlformats.org/drawingml/2006/main" xmlns:r="http://schemas.openxmlformats.org/officeDocument/2006/relationships" xmlns:p="http://schemas.openxmlformats.org/presentationml/2006/main" showMasterSp="0" showMasterPhAnim="0">
   <p:cSld>
     <p:spTree>
@@ -939,7 +940,7 @@
     </p:spTree>
     <p:extLst>
       <p:ext uri="{BB962C8B-B14F-4D97-AF65-F5344CB8AC3E}">
-        <p14:creationId xmlns:p14="http://schemas.microsoft.com/office/powerpoint/2010/main" val="447221675"/>
+        <p14:creationId xmlns:p14="http://schemas.microsoft.com/office/powerpoint/2010/main" val="1753150728"/>
       </p:ext>
     </p:extLst>
   </p:cSld>
@@ -949,7 +950,7 @@
 </p:notes>
 </file>
 
-<file path=ppt/notesSlides/notesSlide4.xml><?xml version="1.0" encoding="utf-8"?>
+<file path=ppt/notesSlides/notesSlide3.xml><?xml version="1.0" encoding="utf-8"?>
 <p:notes xmlns:a="http://schemas.openxmlformats.org/drawingml/2006/main" xmlns:r="http://schemas.openxmlformats.org/officeDocument/2006/relationships" xmlns:p="http://schemas.openxmlformats.org/presentationml/2006/main" showMasterSp="0" showMasterPhAnim="0">
   <p:cSld>
     <p:spTree>
@@ -1055,7 +1056,7 @@
     </p:spTree>
     <p:extLst>
       <p:ext uri="{BB962C8B-B14F-4D97-AF65-F5344CB8AC3E}">
-        <p14:creationId xmlns:p14="http://schemas.microsoft.com/office/powerpoint/2010/main" val="3578302259"/>
+        <p14:creationId xmlns:p14="http://schemas.microsoft.com/office/powerpoint/2010/main" val="447221675"/>
       </p:ext>
     </p:extLst>
   </p:cSld>
@@ -1065,7 +1066,7 @@
 </p:notes>
 </file>
 
-<file path=ppt/notesSlides/notesSlide5.xml><?xml version="1.0" encoding="utf-8"?>
+<file path=ppt/notesSlides/notesSlide4.xml><?xml version="1.0" encoding="utf-8"?>
 <p:notes xmlns:a="http://schemas.openxmlformats.org/drawingml/2006/main" xmlns:r="http://schemas.openxmlformats.org/officeDocument/2006/relationships" xmlns:p="http://schemas.openxmlformats.org/presentationml/2006/main" showMasterSp="0" showMasterPhAnim="0">
   <p:cSld>
     <p:spTree>
@@ -1171,7 +1172,7 @@
     </p:spTree>
     <p:extLst>
       <p:ext uri="{BB962C8B-B14F-4D97-AF65-F5344CB8AC3E}">
-        <p14:creationId xmlns:p14="http://schemas.microsoft.com/office/powerpoint/2010/main" val="3124371085"/>
+        <p14:creationId xmlns:p14="http://schemas.microsoft.com/office/powerpoint/2010/main" val="3578302259"/>
       </p:ext>
     </p:extLst>
   </p:cSld>
@@ -1181,7 +1182,7 @@
 </p:notes>
 </file>
 
-<file path=ppt/notesSlides/notesSlide6.xml><?xml version="1.0" encoding="utf-8"?>
+<file path=ppt/notesSlides/notesSlide5.xml><?xml version="1.0" encoding="utf-8"?>
 <p:notes xmlns:a="http://schemas.openxmlformats.org/drawingml/2006/main" xmlns:r="http://schemas.openxmlformats.org/officeDocument/2006/relationships" xmlns:p="http://schemas.openxmlformats.org/presentationml/2006/main" showMasterSp="0" showMasterPhAnim="0">
   <p:cSld>
     <p:spTree>
@@ -1287,7 +1288,7 @@
     </p:spTree>
     <p:extLst>
       <p:ext uri="{BB962C8B-B14F-4D97-AF65-F5344CB8AC3E}">
-        <p14:creationId xmlns:p14="http://schemas.microsoft.com/office/powerpoint/2010/main" val="1945498219"/>
+        <p14:creationId xmlns:p14="http://schemas.microsoft.com/office/powerpoint/2010/main" val="3124371085"/>
       </p:ext>
     </p:extLst>
   </p:cSld>
@@ -1297,7 +1298,7 @@
 </p:notes>
 </file>
 
-<file path=ppt/notesSlides/notesSlide7.xml><?xml version="1.0" encoding="utf-8"?>
+<file path=ppt/notesSlides/notesSlide6.xml><?xml version="1.0" encoding="utf-8"?>
 <p:notes xmlns:a="http://schemas.openxmlformats.org/drawingml/2006/main" xmlns:r="http://schemas.openxmlformats.org/officeDocument/2006/relationships" xmlns:p="http://schemas.openxmlformats.org/presentationml/2006/main" showMasterSp="0" showMasterPhAnim="0">
   <p:cSld>
     <p:spTree>
@@ -1403,7 +1404,7 @@
     </p:spTree>
     <p:extLst>
       <p:ext uri="{BB962C8B-B14F-4D97-AF65-F5344CB8AC3E}">
-        <p14:creationId xmlns:p14="http://schemas.microsoft.com/office/powerpoint/2010/main" val="3768753353"/>
+        <p14:creationId xmlns:p14="http://schemas.microsoft.com/office/powerpoint/2010/main" val="1945498219"/>
       </p:ext>
     </p:extLst>
   </p:cSld>
@@ -1413,7 +1414,7 @@
 </p:notes>
 </file>
 
-<file path=ppt/notesSlides/notesSlide8.xml><?xml version="1.0" encoding="utf-8"?>
+<file path=ppt/notesSlides/notesSlide7.xml><?xml version="1.0" encoding="utf-8"?>
 <p:notes xmlns:a="http://schemas.openxmlformats.org/drawingml/2006/main" xmlns:r="http://schemas.openxmlformats.org/officeDocument/2006/relationships" xmlns:p="http://schemas.openxmlformats.org/presentationml/2006/main" showMasterSp="0" showMasterPhAnim="0">
   <p:cSld>
     <p:spTree>
@@ -1519,7 +1520,7 @@
     </p:spTree>
     <p:extLst>
       <p:ext uri="{BB962C8B-B14F-4D97-AF65-F5344CB8AC3E}">
-        <p14:creationId xmlns:p14="http://schemas.microsoft.com/office/powerpoint/2010/main" val="3876928790"/>
+        <p14:creationId xmlns:p14="http://schemas.microsoft.com/office/powerpoint/2010/main" val="3768753353"/>
       </p:ext>
     </p:extLst>
   </p:cSld>
@@ -1529,7 +1530,7 @@
 </p:notes>
 </file>
 
-<file path=ppt/notesSlides/notesSlide9.xml><?xml version="1.0" encoding="utf-8"?>
+<file path=ppt/notesSlides/notesSlide8.xml><?xml version="1.0" encoding="utf-8"?>
 <p:notes xmlns:a="http://schemas.openxmlformats.org/drawingml/2006/main" xmlns:r="http://schemas.openxmlformats.org/officeDocument/2006/relationships" xmlns:p="http://schemas.openxmlformats.org/presentationml/2006/main" showMasterSp="0" showMasterPhAnim="0">
   <p:cSld>
     <p:spTree>
@@ -1635,6 +1636,122 @@
     </p:spTree>
     <p:extLst>
       <p:ext uri="{BB962C8B-B14F-4D97-AF65-F5344CB8AC3E}">
+        <p14:creationId xmlns:p14="http://schemas.microsoft.com/office/powerpoint/2010/main" val="3876928790"/>
+      </p:ext>
+    </p:extLst>
+  </p:cSld>
+  <p:clrMapOvr>
+    <a:masterClrMapping/>
+  </p:clrMapOvr>
+</p:notes>
+</file>
+
+<file path=ppt/notesSlides/notesSlide9.xml><?xml version="1.0" encoding="utf-8"?>
+<p:notes xmlns:a="http://schemas.openxmlformats.org/drawingml/2006/main" xmlns:r="http://schemas.openxmlformats.org/officeDocument/2006/relationships" xmlns:p="http://schemas.openxmlformats.org/presentationml/2006/main" showMasterSp="0" showMasterPhAnim="0">
+  <p:cSld>
+    <p:spTree>
+      <p:nvGrpSpPr>
+        <p:cNvPr id="1" name="Shape 31"/>
+        <p:cNvGrpSpPr/>
+        <p:nvPr/>
+      </p:nvGrpSpPr>
+      <p:grpSpPr>
+        <a:xfrm>
+          <a:off x="0" y="0"/>
+          <a:ext cx="0" cy="0"/>
+          <a:chOff x="0" y="0"/>
+          <a:chExt cx="0" cy="0"/>
+        </a:xfrm>
+      </p:grpSpPr>
+      <p:sp>
+        <p:nvSpPr>
+          <p:cNvPr id="32" name="Shape 32"/>
+          <p:cNvSpPr>
+            <a:spLocks noGrp="1" noRot="1" noChangeAspect="1"/>
+          </p:cNvSpPr>
+          <p:nvPr>
+            <p:ph type="sldImg" idx="2"/>
+          </p:nvPr>
+        </p:nvSpPr>
+        <p:spPr>
+          <a:xfrm>
+            <a:off x="1143000" y="685800"/>
+            <a:ext cx="4572000" cy="3429000"/>
+          </a:xfrm>
+          <a:custGeom>
+            <a:avLst/>
+            <a:gdLst/>
+            <a:ahLst/>
+            <a:cxnLst/>
+            <a:rect l="0" t="0" r="0" b="0"/>
+            <a:pathLst>
+              <a:path w="120000" h="120000" extrusionOk="0">
+                <a:moveTo>
+                  <a:pt x="0" y="0"/>
+                </a:moveTo>
+                <a:lnTo>
+                  <a:pt x="120000" y="0"/>
+                </a:lnTo>
+                <a:lnTo>
+                  <a:pt x="120000" y="120000"/>
+                </a:lnTo>
+                <a:lnTo>
+                  <a:pt x="0" y="120000"/>
+                </a:lnTo>
+                <a:close/>
+              </a:path>
+            </a:pathLst>
+          </a:custGeom>
+          <a:noFill/>
+          <a:ln w="9525" cap="flat">
+            <a:solidFill>
+              <a:srgbClr val="000000"/>
+            </a:solidFill>
+            <a:prstDash val="solid"/>
+            <a:round/>
+            <a:headEnd type="none" w="med" len="med"/>
+            <a:tailEnd type="none" w="med" len="med"/>
+          </a:ln>
+        </p:spPr>
+      </p:sp>
+      <p:sp>
+        <p:nvSpPr>
+          <p:cNvPr id="33" name="Shape 33"/>
+          <p:cNvSpPr txBox="1">
+            <a:spLocks noGrp="1"/>
+          </p:cNvSpPr>
+          <p:nvPr>
+            <p:ph type="body" idx="1"/>
+          </p:nvPr>
+        </p:nvSpPr>
+        <p:spPr>
+          <a:xfrm>
+            <a:off x="685800" y="4343400"/>
+            <a:ext cx="5486399" cy="4114800"/>
+          </a:xfrm>
+          <a:prstGeom prst="rect">
+            <a:avLst/>
+          </a:prstGeom>
+        </p:spPr>
+        <p:txBody>
+          <a:bodyPr lIns="91425" tIns="91425" rIns="91425" bIns="91425" anchor="t" anchorCtr="0">
+            <a:noAutofit/>
+          </a:bodyPr>
+          <a:lstStyle/>
+          <a:p>
+            <a:pPr>
+              <a:spcBef>
+                <a:spcPts val="0"/>
+              </a:spcBef>
+              <a:buNone/>
+            </a:pPr>
+            <a:endParaRPr/>
+          </a:p>
+        </p:txBody>
+      </p:sp>
+    </p:spTree>
+    <p:extLst>
+      <p:ext uri="{BB962C8B-B14F-4D97-AF65-F5344CB8AC3E}">
         <p14:creationId xmlns:p14="http://schemas.microsoft.com/office/powerpoint/2010/main" val="1603460421"/>
       </p:ext>
     </p:extLst>
@@ -1826,7 +1943,7 @@
           <a:p>
             <a:fld id="{7C780E36-1438-D74D-8D9C-3089FABA7E39}" type="datetimeFigureOut">
               <a:rPr lang="en-US" smtClean="0"/>
-              <a:t>6/7/17</a:t>
+              <a:t>5/30/18</a:t>
             </a:fld>
             <a:endParaRPr lang="en-US"/>
           </a:p>
@@ -1996,7 +2113,7 @@
           <a:p>
             <a:fld id="{7C780E36-1438-D74D-8D9C-3089FABA7E39}" type="datetimeFigureOut">
               <a:rPr lang="en-US" smtClean="0"/>
-              <a:t>6/7/17</a:t>
+              <a:t>5/30/18</a:t>
             </a:fld>
             <a:endParaRPr lang="en-US"/>
           </a:p>
@@ -2176,7 +2293,7 @@
           <a:p>
             <a:fld id="{7C780E36-1438-D74D-8D9C-3089FABA7E39}" type="datetimeFigureOut">
               <a:rPr lang="en-US" smtClean="0"/>
-              <a:t>6/7/17</a:t>
+              <a:t>5/30/18</a:t>
             </a:fld>
             <a:endParaRPr lang="en-US"/>
           </a:p>
@@ -2651,7 +2768,7 @@
           <a:p>
             <a:fld id="{7C780E36-1438-D74D-8D9C-3089FABA7E39}" type="datetimeFigureOut">
               <a:rPr lang="en-US" smtClean="0"/>
-              <a:t>6/7/17</a:t>
+              <a:t>5/30/18</a:t>
             </a:fld>
             <a:endParaRPr lang="en-US"/>
           </a:p>
@@ -2897,7 +3014,7 @@
           <a:p>
             <a:fld id="{7C780E36-1438-D74D-8D9C-3089FABA7E39}" type="datetimeFigureOut">
               <a:rPr lang="en-US" smtClean="0"/>
-              <a:t>6/7/17</a:t>
+              <a:t>5/30/18</a:t>
             </a:fld>
             <a:endParaRPr lang="en-US"/>
           </a:p>
@@ -3185,7 +3302,7 @@
           <a:p>
             <a:fld id="{7C780E36-1438-D74D-8D9C-3089FABA7E39}" type="datetimeFigureOut">
               <a:rPr lang="en-US" smtClean="0"/>
-              <a:t>6/7/17</a:t>
+              <a:t>5/30/18</a:t>
             </a:fld>
             <a:endParaRPr lang="en-US"/>
           </a:p>
@@ -3607,7 +3724,7 @@
           <a:p>
             <a:fld id="{7C780E36-1438-D74D-8D9C-3089FABA7E39}" type="datetimeFigureOut">
               <a:rPr lang="en-US" smtClean="0"/>
-              <a:t>6/7/17</a:t>
+              <a:t>5/30/18</a:t>
             </a:fld>
             <a:endParaRPr lang="en-US"/>
           </a:p>
@@ -3725,7 +3842,7 @@
           <a:p>
             <a:fld id="{7C780E36-1438-D74D-8D9C-3089FABA7E39}" type="datetimeFigureOut">
               <a:rPr lang="en-US" smtClean="0"/>
-              <a:t>6/7/17</a:t>
+              <a:t>5/30/18</a:t>
             </a:fld>
             <a:endParaRPr lang="en-US"/>
           </a:p>
@@ -3820,7 +3937,7 @@
           <a:p>
             <a:fld id="{7C780E36-1438-D74D-8D9C-3089FABA7E39}" type="datetimeFigureOut">
               <a:rPr lang="en-US" smtClean="0"/>
-              <a:t>6/7/17</a:t>
+              <a:t>5/30/18</a:t>
             </a:fld>
             <a:endParaRPr lang="en-US"/>
           </a:p>
@@ -4097,7 +4214,7 @@
           <a:p>
             <a:fld id="{7C780E36-1438-D74D-8D9C-3089FABA7E39}" type="datetimeFigureOut">
               <a:rPr lang="en-US" smtClean="0"/>
-              <a:t>6/7/17</a:t>
+              <a:t>5/30/18</a:t>
             </a:fld>
             <a:endParaRPr lang="en-US"/>
           </a:p>
@@ -4350,7 +4467,7 @@
           <a:p>
             <a:fld id="{7C780E36-1438-D74D-8D9C-3089FABA7E39}" type="datetimeFigureOut">
               <a:rPr lang="en-US" smtClean="0"/>
-              <a:t>6/7/17</a:t>
+              <a:t>5/30/18</a:t>
             </a:fld>
             <a:endParaRPr lang="en-US"/>
           </a:p>
@@ -4563,7 +4680,7 @@
           <a:p>
             <a:fld id="{7C780E36-1438-D74D-8D9C-3089FABA7E39}" type="datetimeFigureOut">
               <a:rPr lang="en-US" smtClean="0"/>
-              <a:t>6/7/17</a:t>
+              <a:t>5/30/18</a:t>
             </a:fld>
             <a:endParaRPr lang="en-US"/>
           </a:p>
@@ -5180,6 +5297,239 @@
     <p:extLst>
       <p:ext uri="{BB962C8B-B14F-4D97-AF65-F5344CB8AC3E}">
         <p14:creationId xmlns:p14="http://schemas.microsoft.com/office/powerpoint/2010/main" val="1562451193"/>
+      </p:ext>
+    </p:extLst>
+  </p:cSld>
+  <p:clrMapOvr>
+    <a:masterClrMapping/>
+  </p:clrMapOvr>
+  <p:transition xmlns:p14="http://schemas.microsoft.com/office/powerpoint/2010/main" spd="slow">
+    <p:cut/>
+  </p:transition>
+  <p:timing>
+    <p:tnLst>
+      <p:par>
+        <p:cTn xmlns:p14="http://schemas.microsoft.com/office/powerpoint/2010/main" id="1" dur="indefinite" restart="never" nodeType="tmRoot"/>
+      </p:par>
+    </p:tnLst>
+  </p:timing>
+</p:sld>
+</file>
+
+<file path=ppt/slides/slide11.xml><?xml version="1.0" encoding="utf-8"?>
+<p:sld xmlns:a="http://schemas.openxmlformats.org/drawingml/2006/main" xmlns:r="http://schemas.openxmlformats.org/officeDocument/2006/relationships" xmlns:p="http://schemas.openxmlformats.org/presentationml/2006/main">
+  <p:cSld>
+    <p:spTree>
+      <p:nvGrpSpPr>
+        <p:cNvPr id="1" name="Shape 28"/>
+        <p:cNvGrpSpPr/>
+        <p:nvPr/>
+      </p:nvGrpSpPr>
+      <p:grpSpPr>
+        <a:xfrm>
+          <a:off x="0" y="0"/>
+          <a:ext cx="0" cy="0"/>
+          <a:chOff x="0" y="0"/>
+          <a:chExt cx="0" cy="0"/>
+        </a:xfrm>
+      </p:grpSpPr>
+      <p:sp>
+        <p:nvSpPr>
+          <p:cNvPr id="29" name="Shape 29"/>
+          <p:cNvSpPr txBox="1">
+            <a:spLocks noGrp="1"/>
+          </p:cNvSpPr>
+          <p:nvPr>
+            <p:ph type="title"/>
+          </p:nvPr>
+        </p:nvSpPr>
+        <p:spPr>
+          <a:xfrm>
+            <a:off x="457200" y="274637"/>
+            <a:ext cx="8229600" cy="1143000"/>
+          </a:xfrm>
+          <a:prstGeom prst="rect">
+            <a:avLst/>
+          </a:prstGeom>
+        </p:spPr>
+        <p:txBody>
+          <a:bodyPr lIns="91425" tIns="91425" rIns="91425" bIns="91425" anchor="b" anchorCtr="0">
+            <a:noAutofit/>
+          </a:bodyPr>
+          <a:lstStyle/>
+          <a:p>
+            <a:pPr>
+              <a:spcBef>
+                <a:spcPts val="0"/>
+              </a:spcBef>
+              <a:buNone/>
+            </a:pPr>
+            <a:r>
+              <a:rPr lang="en-US" sz="7200" dirty="0" smtClean="0">
+                <a:solidFill>
+                  <a:srgbClr val="FF0000"/>
+                </a:solidFill>
+                <a:latin typeface="Yanone Kaffeesatz Bold"/>
+                <a:cs typeface="Yanone Kaffeesatz Bold"/>
+              </a:rPr>
+              <a:t>Linter</a:t>
+            </a:r>
+            <a:endParaRPr lang="en" sz="7200" dirty="0">
+              <a:solidFill>
+                <a:srgbClr val="FF0000"/>
+              </a:solidFill>
+              <a:latin typeface="Yanone Kaffeesatz Bold"/>
+              <a:cs typeface="Yanone Kaffeesatz Bold"/>
+            </a:endParaRPr>
+          </a:p>
+        </p:txBody>
+      </p:sp>
+      <p:sp>
+        <p:nvSpPr>
+          <p:cNvPr id="30" name="Shape 30"/>
+          <p:cNvSpPr txBox="1">
+            <a:spLocks noGrp="1"/>
+          </p:cNvSpPr>
+          <p:nvPr>
+            <p:ph type="body" idx="1"/>
+          </p:nvPr>
+        </p:nvSpPr>
+        <p:spPr>
+          <a:xfrm>
+            <a:off x="457200" y="1600200"/>
+            <a:ext cx="8229600" cy="4967700"/>
+          </a:xfrm>
+          <a:prstGeom prst="rect">
+            <a:avLst/>
+          </a:prstGeom>
+        </p:spPr>
+        <p:txBody>
+          <a:bodyPr lIns="91425" tIns="91425" rIns="91425" bIns="91425" anchor="t" anchorCtr="0">
+            <a:noAutofit/>
+          </a:bodyPr>
+          <a:lstStyle/>
+          <a:p>
+            <a:pPr marL="457200" lvl="0" indent="-419100">
+              <a:lnSpc>
+                <a:spcPct val="130000"/>
+              </a:lnSpc>
+              <a:buClr>
+                <a:schemeClr val="dk1"/>
+              </a:buClr>
+              <a:buSzPct val="100000"/>
+              <a:buFont typeface="Arial"/>
+              <a:buChar char="●"/>
+            </a:pPr>
+            <a:r>
+              <a:rPr lang="en-US" dirty="0" smtClean="0"/>
+              <a:t>Note to Brandon: </a:t>
+            </a:r>
+          </a:p>
+          <a:p>
+            <a:pPr marL="857250" lvl="1" indent="-419100">
+              <a:lnSpc>
+                <a:spcPct val="130000"/>
+              </a:lnSpc>
+              <a:buClr>
+                <a:schemeClr val="dk1"/>
+              </a:buClr>
+              <a:buSzPct val="100000"/>
+              <a:buFont typeface="Arial"/>
+              <a:buChar char="●"/>
+            </a:pPr>
+            <a:r>
+              <a:rPr lang="en-US" dirty="0"/>
+              <a:t>D</a:t>
+            </a:r>
+            <a:r>
+              <a:rPr lang="en-US" dirty="0" smtClean="0"/>
+              <a:t>id you check on how to install these?</a:t>
+            </a:r>
+          </a:p>
+          <a:p>
+            <a:pPr marL="457200" lvl="0" indent="-419100">
+              <a:lnSpc>
+                <a:spcPct val="130000"/>
+              </a:lnSpc>
+              <a:buClr>
+                <a:schemeClr val="dk1"/>
+              </a:buClr>
+              <a:buSzPct val="100000"/>
+              <a:buFont typeface="Arial"/>
+              <a:buChar char="●"/>
+            </a:pPr>
+            <a:r>
+              <a:rPr lang="en-US" dirty="0" smtClean="0"/>
+              <a:t>A tool that will help keep your code free of errors, both technical and stylistic.</a:t>
+            </a:r>
+          </a:p>
+          <a:p>
+            <a:pPr marL="457200" lvl="0" indent="-419100">
+              <a:lnSpc>
+                <a:spcPct val="130000"/>
+              </a:lnSpc>
+              <a:buClr>
+                <a:schemeClr val="dk1"/>
+              </a:buClr>
+              <a:buSzPct val="100000"/>
+              <a:buFont typeface="Arial"/>
+              <a:buChar char="●"/>
+            </a:pPr>
+            <a:r>
+              <a:rPr lang="en-US" dirty="0" smtClean="0"/>
+              <a:t>Atom makes it easy to use a lot of these.</a:t>
+            </a:r>
+          </a:p>
+          <a:p>
+            <a:pPr marL="457200" lvl="0" indent="-419100">
+              <a:lnSpc>
+                <a:spcPct val="130000"/>
+              </a:lnSpc>
+              <a:buClr>
+                <a:schemeClr val="dk1"/>
+              </a:buClr>
+              <a:buSzPct val="100000"/>
+              <a:buFont typeface="Arial"/>
+              <a:buChar char="●"/>
+            </a:pPr>
+            <a:r>
+              <a:rPr lang="en-US" dirty="0" smtClean="0"/>
+              <a:t>Install, and activate</a:t>
+            </a:r>
+          </a:p>
+          <a:p>
+            <a:pPr marL="457200" lvl="0" indent="-419100">
+              <a:lnSpc>
+                <a:spcPct val="130000"/>
+              </a:lnSpc>
+              <a:buClr>
+                <a:schemeClr val="dk1"/>
+              </a:buClr>
+              <a:buSzPct val="100000"/>
+              <a:buFont typeface="Arial"/>
+              <a:buChar char="●"/>
+            </a:pPr>
+            <a:endParaRPr lang="en-US" dirty="0" smtClean="0"/>
+          </a:p>
+          <a:p>
+            <a:pPr marL="38100" lvl="0" indent="0">
+              <a:lnSpc>
+                <a:spcPct val="130000"/>
+              </a:lnSpc>
+              <a:buClr>
+                <a:schemeClr val="dk1"/>
+              </a:buClr>
+              <a:buSzPct val="100000"/>
+              <a:buNone/>
+            </a:pPr>
+            <a:endParaRPr lang="en-US" dirty="0"/>
+          </a:p>
+        </p:txBody>
+      </p:sp>
+    </p:spTree>
+    <p:extLst>
+      <p:ext uri="{BB962C8B-B14F-4D97-AF65-F5344CB8AC3E}">
+        <p14:creationId xmlns:p14="http://schemas.microsoft.com/office/powerpoint/2010/main" val="1101734994"/>
       </p:ext>
     </p:extLst>
   </p:cSld>

</xml_diff>

<commit_message>
Update day two review
</commit_message>
<xml_diff>
--- a/2018/python/day2-review.pptx
+++ b/2018/python/day2-review.pptx
@@ -5,7 +5,7 @@
     <p:sldMasterId id="2147483648" r:id="rId1"/>
   </p:sldMasterIdLst>
   <p:notesMasterIdLst>
-    <p:notesMasterId r:id="rId13"/>
+    <p:notesMasterId r:id="rId10"/>
   </p:notesMasterIdLst>
   <p:sldIdLst>
     <p:sldId id="257" r:id="rId2"/>
@@ -14,11 +14,8 @@
     <p:sldId id="262" r:id="rId5"/>
     <p:sldId id="263" r:id="rId6"/>
     <p:sldId id="264" r:id="rId7"/>
-    <p:sldId id="276" r:id="rId8"/>
-    <p:sldId id="277" r:id="rId9"/>
-    <p:sldId id="271" r:id="rId10"/>
-    <p:sldId id="272" r:id="rId11"/>
-    <p:sldId id="278" r:id="rId12"/>
+    <p:sldId id="271" r:id="rId8"/>
+    <p:sldId id="272" r:id="rId9"/>
   </p:sldIdLst>
   <p:sldSz cx="9144000" cy="6858000" type="screen4x3"/>
   <p:notesSz cx="6858000" cy="9144000"/>
@@ -119,7 +116,7 @@
   </p:defaultTextStyle>
   <p:extLst>
     <p:ext uri="{EFAFB233-063F-42B5-8137-9DF3F51BA10A}">
-      <p15:sldGuideLst xmlns:p15="http://schemas.microsoft.com/office/powerpoint/2012/main">
+      <p15:sldGuideLst xmlns:p15="http://schemas.microsoft.com/office/powerpoint/2012/main" xmlns="">
         <p15:guide id="1" orient="horz" pos="2160">
           <p15:clr>
             <a:srgbClr val="A4A3A4"/>
@@ -218,7 +215,7 @@
           <a:p>
             <a:fld id="{91BDCAE1-DC13-3545-841A-A4DBCAED93AF}" type="datetimeFigureOut">
               <a:rPr lang="en-US" smtClean="0"/>
-              <a:t>6/1/2018</a:t>
+              <a:t>6/5/18</a:t>
             </a:fld>
             <a:endParaRPr lang="en-US"/>
           </a:p>
@@ -602,7 +599,7 @@
 </p:notes>
 </file>
 
-<file path=ppt/notesSlides/notesSlide10.xml><?xml version="1.0" encoding="utf-8"?>
+<file path=ppt/notesSlides/notesSlide2.xml><?xml version="1.0" encoding="utf-8"?>
 <p:notes xmlns:a="http://schemas.openxmlformats.org/drawingml/2006/main" xmlns:r="http://schemas.openxmlformats.org/officeDocument/2006/relationships" xmlns:p="http://schemas.openxmlformats.org/presentationml/2006/main" showMasterSp="0" showMasterPhAnim="0">
   <p:cSld>
     <p:spTree>
@@ -708,7 +705,7 @@
     </p:spTree>
     <p:extLst>
       <p:ext uri="{BB962C8B-B14F-4D97-AF65-F5344CB8AC3E}">
-        <p14:creationId xmlns:p14="http://schemas.microsoft.com/office/powerpoint/2010/main" val="2384900118"/>
+        <p14:creationId xmlns:p14="http://schemas.microsoft.com/office/powerpoint/2010/main" val="1753150728"/>
       </p:ext>
     </p:extLst>
   </p:cSld>
@@ -718,7 +715,7 @@
 </p:notes>
 </file>
 
-<file path=ppt/notesSlides/notesSlide11.xml><?xml version="1.0" encoding="utf-8"?>
+<file path=ppt/notesSlides/notesSlide3.xml><?xml version="1.0" encoding="utf-8"?>
 <p:notes xmlns:a="http://schemas.openxmlformats.org/drawingml/2006/main" xmlns:r="http://schemas.openxmlformats.org/officeDocument/2006/relationships" xmlns:p="http://schemas.openxmlformats.org/presentationml/2006/main" showMasterSp="0" showMasterPhAnim="0">
   <p:cSld>
     <p:spTree>
@@ -824,7 +821,7 @@
     </p:spTree>
     <p:extLst>
       <p:ext uri="{BB962C8B-B14F-4D97-AF65-F5344CB8AC3E}">
-        <p14:creationId xmlns:p14="http://schemas.microsoft.com/office/powerpoint/2010/main" val="2384900118"/>
+        <p14:creationId xmlns:p14="http://schemas.microsoft.com/office/powerpoint/2010/main" val="447221675"/>
       </p:ext>
     </p:extLst>
   </p:cSld>
@@ -834,7 +831,7 @@
 </p:notes>
 </file>
 
-<file path=ppt/notesSlides/notesSlide2.xml><?xml version="1.0" encoding="utf-8"?>
+<file path=ppt/notesSlides/notesSlide4.xml><?xml version="1.0" encoding="utf-8"?>
 <p:notes xmlns:a="http://schemas.openxmlformats.org/drawingml/2006/main" xmlns:r="http://schemas.openxmlformats.org/officeDocument/2006/relationships" xmlns:p="http://schemas.openxmlformats.org/presentationml/2006/main" showMasterSp="0" showMasterPhAnim="0">
   <p:cSld>
     <p:spTree>
@@ -940,7 +937,7 @@
     </p:spTree>
     <p:extLst>
       <p:ext uri="{BB962C8B-B14F-4D97-AF65-F5344CB8AC3E}">
-        <p14:creationId xmlns:p14="http://schemas.microsoft.com/office/powerpoint/2010/main" val="1753150728"/>
+        <p14:creationId xmlns:p14="http://schemas.microsoft.com/office/powerpoint/2010/main" val="3578302259"/>
       </p:ext>
     </p:extLst>
   </p:cSld>
@@ -950,7 +947,7 @@
 </p:notes>
 </file>
 
-<file path=ppt/notesSlides/notesSlide3.xml><?xml version="1.0" encoding="utf-8"?>
+<file path=ppt/notesSlides/notesSlide5.xml><?xml version="1.0" encoding="utf-8"?>
 <p:notes xmlns:a="http://schemas.openxmlformats.org/drawingml/2006/main" xmlns:r="http://schemas.openxmlformats.org/officeDocument/2006/relationships" xmlns:p="http://schemas.openxmlformats.org/presentationml/2006/main" showMasterSp="0" showMasterPhAnim="0">
   <p:cSld>
     <p:spTree>
@@ -1056,7 +1053,7 @@
     </p:spTree>
     <p:extLst>
       <p:ext uri="{BB962C8B-B14F-4D97-AF65-F5344CB8AC3E}">
-        <p14:creationId xmlns:p14="http://schemas.microsoft.com/office/powerpoint/2010/main" val="447221675"/>
+        <p14:creationId xmlns:p14="http://schemas.microsoft.com/office/powerpoint/2010/main" val="3124371085"/>
       </p:ext>
     </p:extLst>
   </p:cSld>
@@ -1066,7 +1063,7 @@
 </p:notes>
 </file>
 
-<file path=ppt/notesSlides/notesSlide4.xml><?xml version="1.0" encoding="utf-8"?>
+<file path=ppt/notesSlides/notesSlide6.xml><?xml version="1.0" encoding="utf-8"?>
 <p:notes xmlns:a="http://schemas.openxmlformats.org/drawingml/2006/main" xmlns:r="http://schemas.openxmlformats.org/officeDocument/2006/relationships" xmlns:p="http://schemas.openxmlformats.org/presentationml/2006/main" showMasterSp="0" showMasterPhAnim="0">
   <p:cSld>
     <p:spTree>
@@ -1172,7 +1169,7 @@
     </p:spTree>
     <p:extLst>
       <p:ext uri="{BB962C8B-B14F-4D97-AF65-F5344CB8AC3E}">
-        <p14:creationId xmlns:p14="http://schemas.microsoft.com/office/powerpoint/2010/main" val="3578302259"/>
+        <p14:creationId xmlns:p14="http://schemas.microsoft.com/office/powerpoint/2010/main" val="1945498219"/>
       </p:ext>
     </p:extLst>
   </p:cSld>
@@ -1182,7 +1179,7 @@
 </p:notes>
 </file>
 
-<file path=ppt/notesSlides/notesSlide5.xml><?xml version="1.0" encoding="utf-8"?>
+<file path=ppt/notesSlides/notesSlide7.xml><?xml version="1.0" encoding="utf-8"?>
 <p:notes xmlns:a="http://schemas.openxmlformats.org/drawingml/2006/main" xmlns:r="http://schemas.openxmlformats.org/officeDocument/2006/relationships" xmlns:p="http://schemas.openxmlformats.org/presentationml/2006/main" showMasterSp="0" showMasterPhAnim="0">
   <p:cSld>
     <p:spTree>
@@ -1288,7 +1285,7 @@
     </p:spTree>
     <p:extLst>
       <p:ext uri="{BB962C8B-B14F-4D97-AF65-F5344CB8AC3E}">
-        <p14:creationId xmlns:p14="http://schemas.microsoft.com/office/powerpoint/2010/main" val="3124371085"/>
+        <p14:creationId xmlns:p14="http://schemas.microsoft.com/office/powerpoint/2010/main" val="1603460421"/>
       </p:ext>
     </p:extLst>
   </p:cSld>
@@ -1298,7 +1295,7 @@
 </p:notes>
 </file>
 
-<file path=ppt/notesSlides/notesSlide6.xml><?xml version="1.0" encoding="utf-8"?>
+<file path=ppt/notesSlides/notesSlide8.xml><?xml version="1.0" encoding="utf-8"?>
 <p:notes xmlns:a="http://schemas.openxmlformats.org/drawingml/2006/main" xmlns:r="http://schemas.openxmlformats.org/officeDocument/2006/relationships" xmlns:p="http://schemas.openxmlformats.org/presentationml/2006/main" showMasterSp="0" showMasterPhAnim="0">
   <p:cSld>
     <p:spTree>
@@ -1404,355 +1401,7 @@
     </p:spTree>
     <p:extLst>
       <p:ext uri="{BB962C8B-B14F-4D97-AF65-F5344CB8AC3E}">
-        <p14:creationId xmlns:p14="http://schemas.microsoft.com/office/powerpoint/2010/main" val="1945498219"/>
-      </p:ext>
-    </p:extLst>
-  </p:cSld>
-  <p:clrMapOvr>
-    <a:masterClrMapping/>
-  </p:clrMapOvr>
-</p:notes>
-</file>
-
-<file path=ppt/notesSlides/notesSlide7.xml><?xml version="1.0" encoding="utf-8"?>
-<p:notes xmlns:a="http://schemas.openxmlformats.org/drawingml/2006/main" xmlns:r="http://schemas.openxmlformats.org/officeDocument/2006/relationships" xmlns:p="http://schemas.openxmlformats.org/presentationml/2006/main" showMasterSp="0" showMasterPhAnim="0">
-  <p:cSld>
-    <p:spTree>
-      <p:nvGrpSpPr>
-        <p:cNvPr id="1" name="Shape 31"/>
-        <p:cNvGrpSpPr/>
-        <p:nvPr/>
-      </p:nvGrpSpPr>
-      <p:grpSpPr>
-        <a:xfrm>
-          <a:off x="0" y="0"/>
-          <a:ext cx="0" cy="0"/>
-          <a:chOff x="0" y="0"/>
-          <a:chExt cx="0" cy="0"/>
-        </a:xfrm>
-      </p:grpSpPr>
-      <p:sp>
-        <p:nvSpPr>
-          <p:cNvPr id="32" name="Shape 32"/>
-          <p:cNvSpPr>
-            <a:spLocks noGrp="1" noRot="1" noChangeAspect="1"/>
-          </p:cNvSpPr>
-          <p:nvPr>
-            <p:ph type="sldImg" idx="2"/>
-          </p:nvPr>
-        </p:nvSpPr>
-        <p:spPr>
-          <a:xfrm>
-            <a:off x="1143000" y="685800"/>
-            <a:ext cx="4572000" cy="3429000"/>
-          </a:xfrm>
-          <a:custGeom>
-            <a:avLst/>
-            <a:gdLst/>
-            <a:ahLst/>
-            <a:cxnLst/>
-            <a:rect l="0" t="0" r="0" b="0"/>
-            <a:pathLst>
-              <a:path w="120000" h="120000" extrusionOk="0">
-                <a:moveTo>
-                  <a:pt x="0" y="0"/>
-                </a:moveTo>
-                <a:lnTo>
-                  <a:pt x="120000" y="0"/>
-                </a:lnTo>
-                <a:lnTo>
-                  <a:pt x="120000" y="120000"/>
-                </a:lnTo>
-                <a:lnTo>
-                  <a:pt x="0" y="120000"/>
-                </a:lnTo>
-                <a:close/>
-              </a:path>
-            </a:pathLst>
-          </a:custGeom>
-          <a:noFill/>
-          <a:ln w="9525" cap="flat">
-            <a:solidFill>
-              <a:srgbClr val="000000"/>
-            </a:solidFill>
-            <a:prstDash val="solid"/>
-            <a:round/>
-            <a:headEnd type="none" w="med" len="med"/>
-            <a:tailEnd type="none" w="med" len="med"/>
-          </a:ln>
-        </p:spPr>
-      </p:sp>
-      <p:sp>
-        <p:nvSpPr>
-          <p:cNvPr id="33" name="Shape 33"/>
-          <p:cNvSpPr txBox="1">
-            <a:spLocks noGrp="1"/>
-          </p:cNvSpPr>
-          <p:nvPr>
-            <p:ph type="body" idx="1"/>
-          </p:nvPr>
-        </p:nvSpPr>
-        <p:spPr>
-          <a:xfrm>
-            <a:off x="685800" y="4343400"/>
-            <a:ext cx="5486399" cy="4114800"/>
-          </a:xfrm>
-          <a:prstGeom prst="rect">
-            <a:avLst/>
-          </a:prstGeom>
-        </p:spPr>
-        <p:txBody>
-          <a:bodyPr lIns="91425" tIns="91425" rIns="91425" bIns="91425" anchor="t" anchorCtr="0">
-            <a:noAutofit/>
-          </a:bodyPr>
-          <a:lstStyle/>
-          <a:p>
-            <a:pPr>
-              <a:spcBef>
-                <a:spcPts val="0"/>
-              </a:spcBef>
-              <a:buNone/>
-            </a:pPr>
-            <a:endParaRPr/>
-          </a:p>
-        </p:txBody>
-      </p:sp>
-    </p:spTree>
-    <p:extLst>
-      <p:ext uri="{BB962C8B-B14F-4D97-AF65-F5344CB8AC3E}">
-        <p14:creationId xmlns:p14="http://schemas.microsoft.com/office/powerpoint/2010/main" val="3768753353"/>
-      </p:ext>
-    </p:extLst>
-  </p:cSld>
-  <p:clrMapOvr>
-    <a:masterClrMapping/>
-  </p:clrMapOvr>
-</p:notes>
-</file>
-
-<file path=ppt/notesSlides/notesSlide8.xml><?xml version="1.0" encoding="utf-8"?>
-<p:notes xmlns:a="http://schemas.openxmlformats.org/drawingml/2006/main" xmlns:r="http://schemas.openxmlformats.org/officeDocument/2006/relationships" xmlns:p="http://schemas.openxmlformats.org/presentationml/2006/main" showMasterSp="0" showMasterPhAnim="0">
-  <p:cSld>
-    <p:spTree>
-      <p:nvGrpSpPr>
-        <p:cNvPr id="1" name="Shape 31"/>
-        <p:cNvGrpSpPr/>
-        <p:nvPr/>
-      </p:nvGrpSpPr>
-      <p:grpSpPr>
-        <a:xfrm>
-          <a:off x="0" y="0"/>
-          <a:ext cx="0" cy="0"/>
-          <a:chOff x="0" y="0"/>
-          <a:chExt cx="0" cy="0"/>
-        </a:xfrm>
-      </p:grpSpPr>
-      <p:sp>
-        <p:nvSpPr>
-          <p:cNvPr id="32" name="Shape 32"/>
-          <p:cNvSpPr>
-            <a:spLocks noGrp="1" noRot="1" noChangeAspect="1"/>
-          </p:cNvSpPr>
-          <p:nvPr>
-            <p:ph type="sldImg" idx="2"/>
-          </p:nvPr>
-        </p:nvSpPr>
-        <p:spPr>
-          <a:xfrm>
-            <a:off x="1143000" y="685800"/>
-            <a:ext cx="4572000" cy="3429000"/>
-          </a:xfrm>
-          <a:custGeom>
-            <a:avLst/>
-            <a:gdLst/>
-            <a:ahLst/>
-            <a:cxnLst/>
-            <a:rect l="0" t="0" r="0" b="0"/>
-            <a:pathLst>
-              <a:path w="120000" h="120000" extrusionOk="0">
-                <a:moveTo>
-                  <a:pt x="0" y="0"/>
-                </a:moveTo>
-                <a:lnTo>
-                  <a:pt x="120000" y="0"/>
-                </a:lnTo>
-                <a:lnTo>
-                  <a:pt x="120000" y="120000"/>
-                </a:lnTo>
-                <a:lnTo>
-                  <a:pt x="0" y="120000"/>
-                </a:lnTo>
-                <a:close/>
-              </a:path>
-            </a:pathLst>
-          </a:custGeom>
-          <a:noFill/>
-          <a:ln w="9525" cap="flat">
-            <a:solidFill>
-              <a:srgbClr val="000000"/>
-            </a:solidFill>
-            <a:prstDash val="solid"/>
-            <a:round/>
-            <a:headEnd type="none" w="med" len="med"/>
-            <a:tailEnd type="none" w="med" len="med"/>
-          </a:ln>
-        </p:spPr>
-      </p:sp>
-      <p:sp>
-        <p:nvSpPr>
-          <p:cNvPr id="33" name="Shape 33"/>
-          <p:cNvSpPr txBox="1">
-            <a:spLocks noGrp="1"/>
-          </p:cNvSpPr>
-          <p:nvPr>
-            <p:ph type="body" idx="1"/>
-          </p:nvPr>
-        </p:nvSpPr>
-        <p:spPr>
-          <a:xfrm>
-            <a:off x="685800" y="4343400"/>
-            <a:ext cx="5486399" cy="4114800"/>
-          </a:xfrm>
-          <a:prstGeom prst="rect">
-            <a:avLst/>
-          </a:prstGeom>
-        </p:spPr>
-        <p:txBody>
-          <a:bodyPr lIns="91425" tIns="91425" rIns="91425" bIns="91425" anchor="t" anchorCtr="0">
-            <a:noAutofit/>
-          </a:bodyPr>
-          <a:lstStyle/>
-          <a:p>
-            <a:pPr>
-              <a:spcBef>
-                <a:spcPts val="0"/>
-              </a:spcBef>
-              <a:buNone/>
-            </a:pPr>
-            <a:endParaRPr/>
-          </a:p>
-        </p:txBody>
-      </p:sp>
-    </p:spTree>
-    <p:extLst>
-      <p:ext uri="{BB962C8B-B14F-4D97-AF65-F5344CB8AC3E}">
-        <p14:creationId xmlns:p14="http://schemas.microsoft.com/office/powerpoint/2010/main" val="3876928790"/>
-      </p:ext>
-    </p:extLst>
-  </p:cSld>
-  <p:clrMapOvr>
-    <a:masterClrMapping/>
-  </p:clrMapOvr>
-</p:notes>
-</file>
-
-<file path=ppt/notesSlides/notesSlide9.xml><?xml version="1.0" encoding="utf-8"?>
-<p:notes xmlns:a="http://schemas.openxmlformats.org/drawingml/2006/main" xmlns:r="http://schemas.openxmlformats.org/officeDocument/2006/relationships" xmlns:p="http://schemas.openxmlformats.org/presentationml/2006/main" showMasterSp="0" showMasterPhAnim="0">
-  <p:cSld>
-    <p:spTree>
-      <p:nvGrpSpPr>
-        <p:cNvPr id="1" name="Shape 31"/>
-        <p:cNvGrpSpPr/>
-        <p:nvPr/>
-      </p:nvGrpSpPr>
-      <p:grpSpPr>
-        <a:xfrm>
-          <a:off x="0" y="0"/>
-          <a:ext cx="0" cy="0"/>
-          <a:chOff x="0" y="0"/>
-          <a:chExt cx="0" cy="0"/>
-        </a:xfrm>
-      </p:grpSpPr>
-      <p:sp>
-        <p:nvSpPr>
-          <p:cNvPr id="32" name="Shape 32"/>
-          <p:cNvSpPr>
-            <a:spLocks noGrp="1" noRot="1" noChangeAspect="1"/>
-          </p:cNvSpPr>
-          <p:nvPr>
-            <p:ph type="sldImg" idx="2"/>
-          </p:nvPr>
-        </p:nvSpPr>
-        <p:spPr>
-          <a:xfrm>
-            <a:off x="1143000" y="685800"/>
-            <a:ext cx="4572000" cy="3429000"/>
-          </a:xfrm>
-          <a:custGeom>
-            <a:avLst/>
-            <a:gdLst/>
-            <a:ahLst/>
-            <a:cxnLst/>
-            <a:rect l="0" t="0" r="0" b="0"/>
-            <a:pathLst>
-              <a:path w="120000" h="120000" extrusionOk="0">
-                <a:moveTo>
-                  <a:pt x="0" y="0"/>
-                </a:moveTo>
-                <a:lnTo>
-                  <a:pt x="120000" y="0"/>
-                </a:lnTo>
-                <a:lnTo>
-                  <a:pt x="120000" y="120000"/>
-                </a:lnTo>
-                <a:lnTo>
-                  <a:pt x="0" y="120000"/>
-                </a:lnTo>
-                <a:close/>
-              </a:path>
-            </a:pathLst>
-          </a:custGeom>
-          <a:noFill/>
-          <a:ln w="9525" cap="flat">
-            <a:solidFill>
-              <a:srgbClr val="000000"/>
-            </a:solidFill>
-            <a:prstDash val="solid"/>
-            <a:round/>
-            <a:headEnd type="none" w="med" len="med"/>
-            <a:tailEnd type="none" w="med" len="med"/>
-          </a:ln>
-        </p:spPr>
-      </p:sp>
-      <p:sp>
-        <p:nvSpPr>
-          <p:cNvPr id="33" name="Shape 33"/>
-          <p:cNvSpPr txBox="1">
-            <a:spLocks noGrp="1"/>
-          </p:cNvSpPr>
-          <p:nvPr>
-            <p:ph type="body" idx="1"/>
-          </p:nvPr>
-        </p:nvSpPr>
-        <p:spPr>
-          <a:xfrm>
-            <a:off x="685800" y="4343400"/>
-            <a:ext cx="5486399" cy="4114800"/>
-          </a:xfrm>
-          <a:prstGeom prst="rect">
-            <a:avLst/>
-          </a:prstGeom>
-        </p:spPr>
-        <p:txBody>
-          <a:bodyPr lIns="91425" tIns="91425" rIns="91425" bIns="91425" anchor="t" anchorCtr="0">
-            <a:noAutofit/>
-          </a:bodyPr>
-          <a:lstStyle/>
-          <a:p>
-            <a:pPr>
-              <a:spcBef>
-                <a:spcPts val="0"/>
-              </a:spcBef>
-              <a:buNone/>
-            </a:pPr>
-            <a:endParaRPr/>
-          </a:p>
-        </p:txBody>
-      </p:sp>
-    </p:spTree>
-    <p:extLst>
-      <p:ext uri="{BB962C8B-B14F-4D97-AF65-F5344CB8AC3E}">
-        <p14:creationId xmlns:p14="http://schemas.microsoft.com/office/powerpoint/2010/main" val="1603460421"/>
+        <p14:creationId xmlns:p14="http://schemas.microsoft.com/office/powerpoint/2010/main" val="2384900118"/>
       </p:ext>
     </p:extLst>
   </p:cSld>
@@ -1943,7 +1592,7 @@
           <a:p>
             <a:fld id="{7C780E36-1438-D74D-8D9C-3089FABA7E39}" type="datetimeFigureOut">
               <a:rPr lang="en-US" smtClean="0"/>
-              <a:t>6/1/2018</a:t>
+              <a:t>6/5/18</a:t>
             </a:fld>
             <a:endParaRPr lang="en-US"/>
           </a:p>
@@ -2113,7 +1762,7 @@
           <a:p>
             <a:fld id="{7C780E36-1438-D74D-8D9C-3089FABA7E39}" type="datetimeFigureOut">
               <a:rPr lang="en-US" smtClean="0"/>
-              <a:t>6/1/2018</a:t>
+              <a:t>6/5/18</a:t>
             </a:fld>
             <a:endParaRPr lang="en-US"/>
           </a:p>
@@ -2293,7 +1942,7 @@
           <a:p>
             <a:fld id="{7C780E36-1438-D74D-8D9C-3089FABA7E39}" type="datetimeFigureOut">
               <a:rPr lang="en-US" smtClean="0"/>
-              <a:t>6/1/2018</a:t>
+              <a:t>6/5/18</a:t>
             </a:fld>
             <a:endParaRPr lang="en-US"/>
           </a:p>
@@ -2768,7 +2417,7 @@
           <a:p>
             <a:fld id="{7C780E36-1438-D74D-8D9C-3089FABA7E39}" type="datetimeFigureOut">
               <a:rPr lang="en-US" smtClean="0"/>
-              <a:t>6/1/2018</a:t>
+              <a:t>6/5/18</a:t>
             </a:fld>
             <a:endParaRPr lang="en-US"/>
           </a:p>
@@ -3014,7 +2663,7 @@
           <a:p>
             <a:fld id="{7C780E36-1438-D74D-8D9C-3089FABA7E39}" type="datetimeFigureOut">
               <a:rPr lang="en-US" smtClean="0"/>
-              <a:t>6/1/2018</a:t>
+              <a:t>6/5/18</a:t>
             </a:fld>
             <a:endParaRPr lang="en-US"/>
           </a:p>
@@ -3302,7 +2951,7 @@
           <a:p>
             <a:fld id="{7C780E36-1438-D74D-8D9C-3089FABA7E39}" type="datetimeFigureOut">
               <a:rPr lang="en-US" smtClean="0"/>
-              <a:t>6/1/2018</a:t>
+              <a:t>6/5/18</a:t>
             </a:fld>
             <a:endParaRPr lang="en-US"/>
           </a:p>
@@ -3724,7 +3373,7 @@
           <a:p>
             <a:fld id="{7C780E36-1438-D74D-8D9C-3089FABA7E39}" type="datetimeFigureOut">
               <a:rPr lang="en-US" smtClean="0"/>
-              <a:t>6/1/2018</a:t>
+              <a:t>6/5/18</a:t>
             </a:fld>
             <a:endParaRPr lang="en-US"/>
           </a:p>
@@ -3842,7 +3491,7 @@
           <a:p>
             <a:fld id="{7C780E36-1438-D74D-8D9C-3089FABA7E39}" type="datetimeFigureOut">
               <a:rPr lang="en-US" smtClean="0"/>
-              <a:t>6/1/2018</a:t>
+              <a:t>6/5/18</a:t>
             </a:fld>
             <a:endParaRPr lang="en-US"/>
           </a:p>
@@ -3937,7 +3586,7 @@
           <a:p>
             <a:fld id="{7C780E36-1438-D74D-8D9C-3089FABA7E39}" type="datetimeFigureOut">
               <a:rPr lang="en-US" smtClean="0"/>
-              <a:t>6/1/2018</a:t>
+              <a:t>6/5/18</a:t>
             </a:fld>
             <a:endParaRPr lang="en-US"/>
           </a:p>
@@ -4214,7 +3863,7 @@
           <a:p>
             <a:fld id="{7C780E36-1438-D74D-8D9C-3089FABA7E39}" type="datetimeFigureOut">
               <a:rPr lang="en-US" smtClean="0"/>
-              <a:t>6/1/2018</a:t>
+              <a:t>6/5/18</a:t>
             </a:fld>
             <a:endParaRPr lang="en-US"/>
           </a:p>
@@ -4467,7 +4116,7 @@
           <a:p>
             <a:fld id="{7C780E36-1438-D74D-8D9C-3089FABA7E39}" type="datetimeFigureOut">
               <a:rPr lang="en-US" smtClean="0"/>
-              <a:t>6/1/2018</a:t>
+              <a:t>6/5/18</a:t>
             </a:fld>
             <a:endParaRPr lang="en-US"/>
           </a:p>
@@ -4680,7 +4329,7 @@
           <a:p>
             <a:fld id="{7C780E36-1438-D74D-8D9C-3089FABA7E39}" type="datetimeFigureOut">
               <a:rPr lang="en-US" smtClean="0"/>
-              <a:t>6/1/2018</a:t>
+              <a:t>6/5/18</a:t>
             </a:fld>
             <a:endParaRPr lang="en-US"/>
           </a:p>
@@ -5140,11 +4789,7 @@
             </a:pPr>
             <a:r>
               <a:rPr lang="en-US" smtClean="0"/>
-              <a:t>HILT </a:t>
-            </a:r>
-            <a:r>
-              <a:rPr lang="en-US" smtClean="0"/>
-              <a:t>2018</a:t>
+              <a:t>HILT 2018</a:t>
             </a:r>
             <a:endParaRPr lang="en" dirty="0"/>
           </a:p>
@@ -5160,393 +4805,13 @@
   <p:clrMapOvr>
     <a:masterClrMapping/>
   </p:clrMapOvr>
-  <p:transition spd="slow">
+  <p:transition xmlns:p14="http://schemas.microsoft.com/office/powerpoint/2010/main" spd="slow">
     <p:cut/>
   </p:transition>
   <p:timing>
     <p:tnLst>
       <p:par>
-        <p:cTn id="1" dur="indefinite" restart="never" nodeType="tmRoot"/>
-      </p:par>
-    </p:tnLst>
-  </p:timing>
-</p:sld>
-</file>
-
-<file path=ppt/slides/slide10.xml><?xml version="1.0" encoding="utf-8"?>
-<p:sld xmlns:a="http://schemas.openxmlformats.org/drawingml/2006/main" xmlns:r="http://schemas.openxmlformats.org/officeDocument/2006/relationships" xmlns:p="http://schemas.openxmlformats.org/presentationml/2006/main">
-  <p:cSld>
-    <p:spTree>
-      <p:nvGrpSpPr>
-        <p:cNvPr id="1" name="Shape 28"/>
-        <p:cNvGrpSpPr/>
-        <p:nvPr/>
-      </p:nvGrpSpPr>
-      <p:grpSpPr>
-        <a:xfrm>
-          <a:off x="0" y="0"/>
-          <a:ext cx="0" cy="0"/>
-          <a:chOff x="0" y="0"/>
-          <a:chExt cx="0" cy="0"/>
-        </a:xfrm>
-      </p:grpSpPr>
-      <p:sp>
-        <p:nvSpPr>
-          <p:cNvPr id="29" name="Shape 29"/>
-          <p:cNvSpPr txBox="1">
-            <a:spLocks noGrp="1"/>
-          </p:cNvSpPr>
-          <p:nvPr>
-            <p:ph type="title"/>
-          </p:nvPr>
-        </p:nvSpPr>
-        <p:spPr>
-          <a:xfrm>
-            <a:off x="457200" y="274637"/>
-            <a:ext cx="8229600" cy="1143000"/>
-          </a:xfrm>
-          <a:prstGeom prst="rect">
-            <a:avLst/>
-          </a:prstGeom>
-        </p:spPr>
-        <p:txBody>
-          <a:bodyPr lIns="91425" tIns="91425" rIns="91425" bIns="91425" anchor="b" anchorCtr="0">
-            <a:noAutofit/>
-          </a:bodyPr>
-          <a:lstStyle/>
-          <a:p>
-            <a:pPr>
-              <a:spcBef>
-                <a:spcPts val="0"/>
-              </a:spcBef>
-              <a:buNone/>
-            </a:pPr>
-            <a:r>
-              <a:rPr lang="en-US" sz="7200" dirty="0" smtClean="0">
-                <a:solidFill>
-                  <a:srgbClr val="FF0000"/>
-                </a:solidFill>
-                <a:latin typeface="Yanone Kaffeesatz Bold"/>
-                <a:cs typeface="Yanone Kaffeesatz Bold"/>
-              </a:rPr>
-              <a:t>Show and Tell</a:t>
-            </a:r>
-            <a:endParaRPr lang="en" sz="7200" dirty="0">
-              <a:solidFill>
-                <a:srgbClr val="FF0000"/>
-              </a:solidFill>
-              <a:latin typeface="Yanone Kaffeesatz Bold"/>
-              <a:cs typeface="Yanone Kaffeesatz Bold"/>
-            </a:endParaRPr>
-          </a:p>
-        </p:txBody>
-      </p:sp>
-      <p:sp>
-        <p:nvSpPr>
-          <p:cNvPr id="30" name="Shape 30"/>
-          <p:cNvSpPr txBox="1">
-            <a:spLocks noGrp="1"/>
-          </p:cNvSpPr>
-          <p:nvPr>
-            <p:ph type="body" idx="1"/>
-          </p:nvPr>
-        </p:nvSpPr>
-        <p:spPr>
-          <a:xfrm>
-            <a:off x="457200" y="1600200"/>
-            <a:ext cx="8229600" cy="4967700"/>
-          </a:xfrm>
-          <a:prstGeom prst="rect">
-            <a:avLst/>
-          </a:prstGeom>
-        </p:spPr>
-        <p:txBody>
-          <a:bodyPr lIns="91425" tIns="91425" rIns="91425" bIns="91425" anchor="t" anchorCtr="0">
-            <a:noAutofit/>
-          </a:bodyPr>
-          <a:lstStyle/>
-          <a:p>
-            <a:pPr marL="457200" lvl="0" indent="-419100">
-              <a:lnSpc>
-                <a:spcPct val="130000"/>
-              </a:lnSpc>
-              <a:buClr>
-                <a:schemeClr val="dk1"/>
-              </a:buClr>
-              <a:buSzPct val="100000"/>
-              <a:buFont typeface="Arial"/>
-              <a:buChar char="●"/>
-            </a:pPr>
-            <a:r>
-              <a:rPr lang="en-US" dirty="0" smtClean="0"/>
-              <a:t>Start thinking about it...</a:t>
-            </a:r>
-          </a:p>
-          <a:p>
-            <a:pPr marL="38100" lvl="0" indent="0">
-              <a:lnSpc>
-                <a:spcPct val="130000"/>
-              </a:lnSpc>
-              <a:buClr>
-                <a:schemeClr val="dk1"/>
-              </a:buClr>
-              <a:buSzPct val="100000"/>
-              <a:buNone/>
-            </a:pPr>
-            <a:endParaRPr lang="en-US" dirty="0"/>
-          </a:p>
-        </p:txBody>
-      </p:sp>
-    </p:spTree>
-    <p:extLst>
-      <p:ext uri="{BB962C8B-B14F-4D97-AF65-F5344CB8AC3E}">
-        <p14:creationId xmlns:p14="http://schemas.microsoft.com/office/powerpoint/2010/main" val="1562451193"/>
-      </p:ext>
-    </p:extLst>
-  </p:cSld>
-  <p:clrMapOvr>
-    <a:masterClrMapping/>
-  </p:clrMapOvr>
-  <p:transition spd="slow">
-    <p:cut/>
-  </p:transition>
-  <p:timing>
-    <p:tnLst>
-      <p:par>
-        <p:cTn id="1" dur="indefinite" restart="never" nodeType="tmRoot"/>
-      </p:par>
-    </p:tnLst>
-  </p:timing>
-</p:sld>
-</file>
-
-<file path=ppt/slides/slide11.xml><?xml version="1.0" encoding="utf-8"?>
-<p:sld xmlns:a="http://schemas.openxmlformats.org/drawingml/2006/main" xmlns:r="http://schemas.openxmlformats.org/officeDocument/2006/relationships" xmlns:p="http://schemas.openxmlformats.org/presentationml/2006/main">
-  <p:cSld>
-    <p:spTree>
-      <p:nvGrpSpPr>
-        <p:cNvPr id="1" name="Shape 28"/>
-        <p:cNvGrpSpPr/>
-        <p:nvPr/>
-      </p:nvGrpSpPr>
-      <p:grpSpPr>
-        <a:xfrm>
-          <a:off x="0" y="0"/>
-          <a:ext cx="0" cy="0"/>
-          <a:chOff x="0" y="0"/>
-          <a:chExt cx="0" cy="0"/>
-        </a:xfrm>
-      </p:grpSpPr>
-      <p:sp>
-        <p:nvSpPr>
-          <p:cNvPr id="29" name="Shape 29"/>
-          <p:cNvSpPr txBox="1">
-            <a:spLocks noGrp="1"/>
-          </p:cNvSpPr>
-          <p:nvPr>
-            <p:ph type="title"/>
-          </p:nvPr>
-        </p:nvSpPr>
-        <p:spPr>
-          <a:xfrm>
-            <a:off x="457200" y="274637"/>
-            <a:ext cx="8229600" cy="1143000"/>
-          </a:xfrm>
-          <a:prstGeom prst="rect">
-            <a:avLst/>
-          </a:prstGeom>
-        </p:spPr>
-        <p:txBody>
-          <a:bodyPr lIns="91425" tIns="91425" rIns="91425" bIns="91425" anchor="b" anchorCtr="0">
-            <a:noAutofit/>
-          </a:bodyPr>
-          <a:lstStyle/>
-          <a:p>
-            <a:pPr>
-              <a:spcBef>
-                <a:spcPts val="0"/>
-              </a:spcBef>
-              <a:buNone/>
-            </a:pPr>
-            <a:r>
-              <a:rPr lang="en-US" sz="7200" dirty="0" smtClean="0">
-                <a:solidFill>
-                  <a:srgbClr val="FF0000"/>
-                </a:solidFill>
-                <a:latin typeface="Yanone Kaffeesatz Bold"/>
-                <a:cs typeface="Yanone Kaffeesatz Bold"/>
-              </a:rPr>
-              <a:t>Linter</a:t>
-            </a:r>
-            <a:endParaRPr lang="en" sz="7200" dirty="0">
-              <a:solidFill>
-                <a:srgbClr val="FF0000"/>
-              </a:solidFill>
-              <a:latin typeface="Yanone Kaffeesatz Bold"/>
-              <a:cs typeface="Yanone Kaffeesatz Bold"/>
-            </a:endParaRPr>
-          </a:p>
-        </p:txBody>
-      </p:sp>
-      <p:sp>
-        <p:nvSpPr>
-          <p:cNvPr id="30" name="Shape 30"/>
-          <p:cNvSpPr txBox="1">
-            <a:spLocks noGrp="1"/>
-          </p:cNvSpPr>
-          <p:nvPr>
-            <p:ph type="body" idx="1"/>
-          </p:nvPr>
-        </p:nvSpPr>
-        <p:spPr>
-          <a:xfrm>
-            <a:off x="457200" y="1600200"/>
-            <a:ext cx="8229600" cy="4967700"/>
-          </a:xfrm>
-          <a:prstGeom prst="rect">
-            <a:avLst/>
-          </a:prstGeom>
-        </p:spPr>
-        <p:txBody>
-          <a:bodyPr lIns="91425" tIns="91425" rIns="91425" bIns="91425" anchor="t" anchorCtr="0">
-            <a:noAutofit/>
-          </a:bodyPr>
-          <a:lstStyle/>
-          <a:p>
-            <a:pPr marL="457200" lvl="0" indent="-419100">
-              <a:lnSpc>
-                <a:spcPct val="130000"/>
-              </a:lnSpc>
-              <a:buClr>
-                <a:schemeClr val="dk1"/>
-              </a:buClr>
-              <a:buSzPct val="100000"/>
-              <a:buFont typeface="Arial"/>
-              <a:buChar char="●"/>
-            </a:pPr>
-            <a:r>
-              <a:rPr lang="en-US" dirty="0" smtClean="0"/>
-              <a:t>Note to Brandon: </a:t>
-            </a:r>
-          </a:p>
-          <a:p>
-            <a:pPr marL="857250" lvl="1" indent="-419100">
-              <a:lnSpc>
-                <a:spcPct val="130000"/>
-              </a:lnSpc>
-              <a:buClr>
-                <a:schemeClr val="dk1"/>
-              </a:buClr>
-              <a:buSzPct val="100000"/>
-              <a:buFont typeface="Arial"/>
-              <a:buChar char="●"/>
-            </a:pPr>
-            <a:r>
-              <a:rPr lang="en-US" dirty="0"/>
-              <a:t>D</a:t>
-            </a:r>
-            <a:r>
-              <a:rPr lang="en-US" dirty="0" smtClean="0"/>
-              <a:t>id you check on how to install these?</a:t>
-            </a:r>
-          </a:p>
-          <a:p>
-            <a:pPr marL="457200" lvl="0" indent="-419100">
-              <a:lnSpc>
-                <a:spcPct val="130000"/>
-              </a:lnSpc>
-              <a:buClr>
-                <a:schemeClr val="dk1"/>
-              </a:buClr>
-              <a:buSzPct val="100000"/>
-              <a:buFont typeface="Arial"/>
-              <a:buChar char="●"/>
-            </a:pPr>
-            <a:r>
-              <a:rPr lang="en-US" dirty="0" smtClean="0"/>
-              <a:t>A tool that will help keep your code free of errors, both technical and stylistic.</a:t>
-            </a:r>
-          </a:p>
-          <a:p>
-            <a:pPr marL="457200" lvl="0" indent="-419100">
-              <a:lnSpc>
-                <a:spcPct val="130000"/>
-              </a:lnSpc>
-              <a:buClr>
-                <a:schemeClr val="dk1"/>
-              </a:buClr>
-              <a:buSzPct val="100000"/>
-              <a:buFont typeface="Arial"/>
-              <a:buChar char="●"/>
-            </a:pPr>
-            <a:r>
-              <a:rPr lang="en-US" dirty="0" smtClean="0"/>
-              <a:t>Atom makes it easy to use a lot of these.</a:t>
-            </a:r>
-          </a:p>
-          <a:p>
-            <a:pPr marL="457200" lvl="0" indent="-419100">
-              <a:lnSpc>
-                <a:spcPct val="130000"/>
-              </a:lnSpc>
-              <a:buClr>
-                <a:schemeClr val="dk1"/>
-              </a:buClr>
-              <a:buSzPct val="100000"/>
-              <a:buFont typeface="Arial"/>
-              <a:buChar char="●"/>
-            </a:pPr>
-            <a:r>
-              <a:rPr lang="en-US" dirty="0" smtClean="0"/>
-              <a:t>Install, and activate</a:t>
-            </a:r>
-          </a:p>
-          <a:p>
-            <a:pPr marL="457200" lvl="0" indent="-419100">
-              <a:lnSpc>
-                <a:spcPct val="130000"/>
-              </a:lnSpc>
-              <a:buClr>
-                <a:schemeClr val="dk1"/>
-              </a:buClr>
-              <a:buSzPct val="100000"/>
-              <a:buFont typeface="Arial"/>
-              <a:buChar char="●"/>
-            </a:pPr>
-            <a:endParaRPr lang="en-US" dirty="0" smtClean="0"/>
-          </a:p>
-          <a:p>
-            <a:pPr marL="38100" lvl="0" indent="0">
-              <a:lnSpc>
-                <a:spcPct val="130000"/>
-              </a:lnSpc>
-              <a:buClr>
-                <a:schemeClr val="dk1"/>
-              </a:buClr>
-              <a:buSzPct val="100000"/>
-              <a:buNone/>
-            </a:pPr>
-            <a:endParaRPr lang="en-US" dirty="0"/>
-          </a:p>
-        </p:txBody>
-      </p:sp>
-    </p:spTree>
-    <p:extLst>
-      <p:ext uri="{BB962C8B-B14F-4D97-AF65-F5344CB8AC3E}">
-        <p14:creationId xmlns:p14="http://schemas.microsoft.com/office/powerpoint/2010/main" val="1101734994"/>
-      </p:ext>
-    </p:extLst>
-  </p:cSld>
-  <p:clrMapOvr>
-    <a:masterClrMapping/>
-  </p:clrMapOvr>
-  <p:transition spd="slow">
-    <p:cut/>
-  </p:transition>
-  <p:timing>
-    <p:tnLst>
-      <p:par>
-        <p:cTn id="1" dur="indefinite" restart="never" nodeType="tmRoot"/>
+        <p:cTn xmlns:p14="http://schemas.microsoft.com/office/powerpoint/2010/main" id="1" dur="indefinite" restart="never" nodeType="tmRoot"/>
       </p:par>
     </p:tnLst>
   </p:timing>
@@ -5722,28 +4987,13 @@
             </a:pPr>
             <a:r>
               <a:rPr lang="en-US" dirty="0" smtClean="0"/>
-              <a:t>Why Python? Why not?</a:t>
-            </a:r>
-          </a:p>
-          <a:p>
-            <a:pPr marL="457200" lvl="0" indent="-419100" rtl="0">
-              <a:lnSpc>
-                <a:spcPct val="130000"/>
-              </a:lnSpc>
-              <a:spcBef>
-                <a:spcPts val="0"/>
-              </a:spcBef>
-              <a:buClr>
-                <a:schemeClr val="dk1"/>
-              </a:buClr>
-              <a:buSzPct val="100000"/>
-              <a:buFont typeface="Arial"/>
-              <a:buChar char="●"/>
-            </a:pPr>
+              <a:t>Why Python? Why not</a:t>
+            </a:r>
             <a:r>
               <a:rPr lang="en-US" dirty="0" smtClean="0"/>
-              <a:t>What happens if you use PHP in a project?</a:t>
-            </a:r>
+              <a:t>?</a:t>
+            </a:r>
+            <a:endParaRPr lang="en-US" dirty="0" smtClean="0"/>
           </a:p>
         </p:txBody>
       </p:sp>
@@ -5757,13 +5007,13 @@
   <p:clrMapOvr>
     <a:masterClrMapping/>
   </p:clrMapOvr>
-  <p:transition spd="slow">
+  <p:transition xmlns:p14="http://schemas.microsoft.com/office/powerpoint/2010/main" spd="slow">
     <p:cut/>
   </p:transition>
   <p:timing>
     <p:tnLst>
       <p:par>
-        <p:cTn id="1" dur="indefinite" restart="never" nodeType="tmRoot"/>
+        <p:cTn xmlns:p14="http://schemas.microsoft.com/office/powerpoint/2010/main" id="1" dur="indefinite" restart="never" nodeType="tmRoot"/>
       </p:par>
     </p:tnLst>
   </p:timing>
@@ -5999,13 +5249,13 @@
   <p:clrMapOvr>
     <a:masterClrMapping/>
   </p:clrMapOvr>
-  <p:transition spd="slow">
+  <p:transition xmlns:p14="http://schemas.microsoft.com/office/powerpoint/2010/main" spd="slow">
     <p:cut/>
   </p:transition>
   <p:timing>
     <p:tnLst>
       <p:par>
-        <p:cTn id="1" dur="indefinite" restart="never" nodeType="tmRoot"/>
+        <p:cTn xmlns:p14="http://schemas.microsoft.com/office/powerpoint/2010/main" id="1" dur="indefinite" restart="never" nodeType="tmRoot"/>
       </p:par>
     </p:tnLst>
   </p:timing>
@@ -6172,13 +5422,13 @@
   <p:clrMapOvr>
     <a:masterClrMapping/>
   </p:clrMapOvr>
-  <p:transition spd="slow">
+  <p:transition xmlns:p14="http://schemas.microsoft.com/office/powerpoint/2010/main" spd="slow">
     <p:cut/>
   </p:transition>
   <p:timing>
     <p:tnLst>
       <p:par>
-        <p:cTn id="1" dur="indefinite" restart="never" nodeType="tmRoot"/>
+        <p:cTn xmlns:p14="http://schemas.microsoft.com/office/powerpoint/2010/main" id="1" dur="indefinite" restart="never" nodeType="tmRoot"/>
       </p:par>
     </p:tnLst>
   </p:timing>
@@ -6353,13 +5603,13 @@
   <p:clrMapOvr>
     <a:masterClrMapping/>
   </p:clrMapOvr>
-  <p:transition spd="slow">
+  <p:transition xmlns:p14="http://schemas.microsoft.com/office/powerpoint/2010/main" spd="slow">
     <p:cut/>
   </p:transition>
   <p:timing>
     <p:tnLst>
       <p:par>
-        <p:cTn id="1" dur="indefinite" restart="never" nodeType="tmRoot"/>
+        <p:cTn xmlns:p14="http://schemas.microsoft.com/office/powerpoint/2010/main" id="1" dur="indefinite" restart="never" nodeType="tmRoot"/>
       </p:par>
     </p:tnLst>
   </p:timing>
@@ -6505,13 +5755,13 @@
   <p:clrMapOvr>
     <a:masterClrMapping/>
   </p:clrMapOvr>
-  <p:transition spd="slow">
+  <p:transition xmlns:p14="http://schemas.microsoft.com/office/powerpoint/2010/main" spd="slow">
     <p:cut/>
   </p:transition>
   <p:timing>
     <p:tnLst>
       <p:par>
-        <p:cTn id="1" dur="indefinite" restart="never" nodeType="tmRoot"/>
+        <p:cTn xmlns:p14="http://schemas.microsoft.com/office/powerpoint/2010/main" id="1" dur="indefinite" restart="never" nodeType="tmRoot"/>
       </p:par>
     </p:tnLst>
   </p:timing>
@@ -6574,7 +5824,7 @@
                 <a:latin typeface="Yanone Kaffeesatz Bold"/>
                 <a:cs typeface="Yanone Kaffeesatz Bold"/>
               </a:rPr>
-              <a:t>Methods</a:t>
+              <a:t>Plan</a:t>
             </a:r>
             <a:endParaRPr lang="en" sz="7200" dirty="0">
               <a:solidFill>
@@ -6611,7 +5861,83 @@
           </a:bodyPr>
           <a:lstStyle/>
           <a:p>
-            <a:pPr marL="38100" lvl="0" indent="0">
+            <a:pPr marL="457200" marR="0" lvl="0" indent="-419100" defTabSz="914400" eaLnBrk="1" fontAlgn="auto" latinLnBrk="0" hangingPunct="1">
+              <a:lnSpc>
+                <a:spcPct val="130000"/>
+              </a:lnSpc>
+              <a:spcBef>
+                <a:spcPts val="0"/>
+              </a:spcBef>
+              <a:spcAft>
+                <a:spcPts val="0"/>
+              </a:spcAft>
+              <a:buClr>
+                <a:schemeClr val="dk1"/>
+              </a:buClr>
+              <a:buSzPct val="100000"/>
+              <a:buFontTx/>
+              <a:buNone/>
+              <a:tabLst/>
+              <a:defRPr/>
+            </a:pPr>
+            <a:r>
+              <a:rPr lang="en-US" dirty="0"/>
+              <a:t>Keep going!</a:t>
+            </a:r>
+          </a:p>
+          <a:p>
+            <a:pPr marL="457200" marR="0" lvl="0" indent="-419100" defTabSz="914400" eaLnBrk="1" fontAlgn="auto" latinLnBrk="0" hangingPunct="1">
+              <a:lnSpc>
+                <a:spcPct val="130000"/>
+              </a:lnSpc>
+              <a:spcBef>
+                <a:spcPts val="0"/>
+              </a:spcBef>
+              <a:spcAft>
+                <a:spcPts val="0"/>
+              </a:spcAft>
+              <a:buClr>
+                <a:schemeClr val="dk1"/>
+              </a:buClr>
+              <a:buSzPct val="100000"/>
+              <a:buFontTx/>
+              <a:buNone/>
+              <a:tabLst/>
+              <a:defRPr/>
+            </a:pPr>
+            <a:endParaRPr lang="en-US" dirty="0"/>
+          </a:p>
+          <a:p>
+            <a:pPr marL="457200" marR="0" lvl="0" indent="-419100" defTabSz="914400" eaLnBrk="1" fontAlgn="auto" latinLnBrk="0" hangingPunct="1">
+              <a:lnSpc>
+                <a:spcPct val="130000"/>
+              </a:lnSpc>
+              <a:spcBef>
+                <a:spcPts val="0"/>
+              </a:spcBef>
+              <a:spcAft>
+                <a:spcPts val="0"/>
+              </a:spcAft>
+              <a:buClr>
+                <a:schemeClr val="dk1"/>
+              </a:buClr>
+              <a:buSzPct val="100000"/>
+              <a:buFontTx/>
+              <a:buNone/>
+              <a:tabLst/>
+              <a:defRPr/>
+            </a:pPr>
+            <a:r>
+              <a:rPr lang="en-US" dirty="0"/>
+              <a:t>But we take requests</a:t>
+            </a:r>
+            <a:r>
+              <a:rPr lang="en-US" dirty="0" smtClean="0"/>
+              <a:t>! In particular, top choices from the poll were…</a:t>
+            </a:r>
+          </a:p>
+          <a:p>
+            <a:pPr marL="495300" indent="-457200" defTabSz="914400">
               <a:lnSpc>
                 <a:spcPct val="130000"/>
               </a:lnSpc>
@@ -6619,27 +5945,15 @@
                 <a:schemeClr val="dk1"/>
               </a:buClr>
               <a:buSzPct val="100000"/>
-              <a:buNone/>
+              <a:defRPr/>
             </a:pPr>
             <a:r>
-              <a:rPr lang="en-US" dirty="0" err="1" smtClean="0"/>
-              <a:t>def</a:t>
-            </a:r>
-            <a:r>
               <a:rPr lang="en-US" dirty="0" smtClean="0"/>
-              <a:t> </a:t>
-            </a:r>
-            <a:r>
-              <a:rPr lang="en-US" dirty="0" err="1" smtClean="0"/>
-              <a:t>method_name</a:t>
-            </a:r>
-            <a:r>
-              <a:rPr lang="en-US" dirty="0" smtClean="0"/>
-              <a:t>():</a:t>
-            </a:r>
-          </a:p>
-          <a:p>
-            <a:pPr marL="38100" lvl="0" indent="0">
+              <a:t>student projects</a:t>
+            </a:r>
+          </a:p>
+          <a:p>
+            <a:pPr marL="495300" indent="-457200" defTabSz="914400">
               <a:lnSpc>
                 <a:spcPct val="130000"/>
               </a:lnSpc>
@@ -6647,15 +5961,15 @@
                 <a:schemeClr val="dk1"/>
               </a:buClr>
               <a:buSzPct val="100000"/>
-              <a:buNone/>
+              <a:defRPr/>
             </a:pPr>
             <a:r>
               <a:rPr lang="en-US" dirty="0" smtClean="0"/>
-              <a:t>	# what the method does!</a:t>
-            </a:r>
-          </a:p>
-          <a:p>
-            <a:pPr marL="38100" lvl="0" indent="0">
+              <a:t>useful libraries</a:t>
+            </a:r>
+          </a:p>
+          <a:p>
+            <a:pPr marL="495300" indent="-457200" defTabSz="914400">
               <a:lnSpc>
                 <a:spcPct val="130000"/>
               </a:lnSpc>
@@ -6663,58 +5977,33 @@
                 <a:schemeClr val="dk1"/>
               </a:buClr>
               <a:buSzPct val="100000"/>
-              <a:buNone/>
+              <a:defRPr/>
             </a:pPr>
-            <a:endParaRPr lang="en-US" dirty="0" smtClean="0"/>
-          </a:p>
-          <a:p>
-            <a:pPr marL="38100" lvl="0" indent="0">
-              <a:lnSpc>
-                <a:spcPct val="130000"/>
-              </a:lnSpc>
-              <a:buClr>
-                <a:schemeClr val="dk1"/>
-              </a:buClr>
-              <a:buSzPct val="100000"/>
-              <a:buNone/>
-            </a:pPr>
+            <a:r>
+              <a:rPr lang="en-US" dirty="0" smtClean="0"/>
+              <a:t>how to work with data and these tools</a:t>
+            </a:r>
             <a:endParaRPr lang="en-US" dirty="0"/>
-          </a:p>
-          <a:p>
-            <a:pPr marL="38100" lvl="0" indent="0">
-              <a:lnSpc>
-                <a:spcPct val="130000"/>
-              </a:lnSpc>
-              <a:buClr>
-                <a:schemeClr val="dk1"/>
-              </a:buClr>
-              <a:buSzPct val="100000"/>
-              <a:buNone/>
-            </a:pPr>
-            <a:r>
-              <a:rPr lang="en-US" dirty="0" smtClean="0"/>
-              <a:t>All methods start with a def.</a:t>
-            </a:r>
           </a:p>
         </p:txBody>
       </p:sp>
     </p:spTree>
     <p:extLst>
       <p:ext uri="{BB962C8B-B14F-4D97-AF65-F5344CB8AC3E}">
-        <p14:creationId xmlns:p14="http://schemas.microsoft.com/office/powerpoint/2010/main" val="353125055"/>
+        <p14:creationId xmlns:p14="http://schemas.microsoft.com/office/powerpoint/2010/main" val="918242060"/>
       </p:ext>
     </p:extLst>
   </p:cSld>
   <p:clrMapOvr>
     <a:masterClrMapping/>
   </p:clrMapOvr>
-  <p:transition spd="slow">
+  <p:transition xmlns:p14="http://schemas.microsoft.com/office/powerpoint/2010/main" spd="slow">
     <p:cut/>
   </p:transition>
   <p:timing>
     <p:tnLst>
       <p:par>
-        <p:cTn id="1" dur="indefinite" restart="never" nodeType="tmRoot"/>
+        <p:cTn xmlns:p14="http://schemas.microsoft.com/office/powerpoint/2010/main" id="1" dur="indefinite" restart="never" nodeType="tmRoot"/>
       </p:par>
     </p:tnLst>
   </p:timing>
@@ -6777,7 +6066,7 @@
                 <a:latin typeface="Yanone Kaffeesatz Bold"/>
                 <a:cs typeface="Yanone Kaffeesatz Bold"/>
               </a:rPr>
-              <a:t>Methods</a:t>
+              <a:t>Show and Tell</a:t>
             </a:r>
             <a:endParaRPr lang="en" sz="7200" dirty="0">
               <a:solidFill>
@@ -6814,6 +6103,23 @@
           </a:bodyPr>
           <a:lstStyle/>
           <a:p>
+            <a:pPr marL="457200" lvl="0" indent="-419100">
+              <a:lnSpc>
+                <a:spcPct val="130000"/>
+              </a:lnSpc>
+              <a:buClr>
+                <a:schemeClr val="dk1"/>
+              </a:buClr>
+              <a:buSzPct val="100000"/>
+              <a:buFont typeface="Arial"/>
+              <a:buChar char="●"/>
+            </a:pPr>
+            <a:r>
+              <a:rPr lang="en-US" dirty="0" smtClean="0"/>
+              <a:t>Start thinking about it...</a:t>
+            </a:r>
+          </a:p>
+          <a:p>
             <a:pPr marL="38100" lvl="0" indent="0">
               <a:lnSpc>
                 <a:spcPct val="130000"/>
@@ -6824,346 +6130,27 @@
               <a:buSzPct val="100000"/>
               <a:buNone/>
             </a:pPr>
-            <a:r>
-              <a:rPr lang="en-US" dirty="0" err="1" smtClean="0"/>
-              <a:t>def</a:t>
-            </a:r>
-            <a:r>
-              <a:rPr lang="en-US" dirty="0" smtClean="0"/>
-              <a:t> </a:t>
-            </a:r>
-            <a:r>
-              <a:rPr lang="en-US" dirty="0" err="1" smtClean="0"/>
-              <a:t>method_name</a:t>
-            </a:r>
-            <a:r>
-              <a:rPr lang="en-US" dirty="0" smtClean="0"/>
-              <a:t>():</a:t>
-            </a:r>
-          </a:p>
-          <a:p>
-            <a:pPr marL="38100" lvl="0" indent="0">
-              <a:lnSpc>
-                <a:spcPct val="130000"/>
-              </a:lnSpc>
-              <a:buClr>
-                <a:schemeClr val="dk1"/>
-              </a:buClr>
-              <a:buSzPct val="100000"/>
-              <a:buNone/>
-            </a:pPr>
-            <a:r>
-              <a:rPr lang="en-US" dirty="0" smtClean="0"/>
-              <a:t>	…</a:t>
-            </a:r>
-          </a:p>
-          <a:p>
-            <a:pPr marL="38100" lvl="0" indent="0">
-              <a:lnSpc>
-                <a:spcPct val="130000"/>
-              </a:lnSpc>
-              <a:buClr>
-                <a:schemeClr val="dk1"/>
-              </a:buClr>
-              <a:buSzPct val="100000"/>
-              <a:buNone/>
-            </a:pPr>
-            <a:r>
-              <a:rPr lang="en-US" dirty="0" smtClean="0"/>
-              <a:t>	…</a:t>
-            </a:r>
-          </a:p>
-          <a:p>
-            <a:pPr marL="38100" lvl="0" indent="0">
-              <a:lnSpc>
-                <a:spcPct val="130000"/>
-              </a:lnSpc>
-              <a:buClr>
-                <a:schemeClr val="dk1"/>
-              </a:buClr>
-              <a:buSzPct val="100000"/>
-              <a:buNone/>
-            </a:pPr>
-            <a:endParaRPr lang="en-US" dirty="0" smtClean="0"/>
-          </a:p>
-          <a:p>
-            <a:pPr marL="38100" lvl="0" indent="0">
-              <a:lnSpc>
-                <a:spcPct val="130000"/>
-              </a:lnSpc>
-              <a:buClr>
-                <a:schemeClr val="dk1"/>
-              </a:buClr>
-              <a:buSzPct val="100000"/>
-              <a:buNone/>
-            </a:pPr>
-            <a:r>
-              <a:rPr lang="en-US" dirty="0" err="1"/>
-              <a:t>m</a:t>
-            </a:r>
-            <a:r>
-              <a:rPr lang="en-US" dirty="0" err="1" smtClean="0"/>
-              <a:t>ethod_name</a:t>
-            </a:r>
-            <a:r>
-              <a:rPr lang="en-US" dirty="0" smtClean="0"/>
-              <a:t>()</a:t>
-            </a:r>
-          </a:p>
-          <a:p>
-            <a:pPr marL="38100" lvl="0" indent="0">
-              <a:lnSpc>
-                <a:spcPct val="130000"/>
-              </a:lnSpc>
-              <a:buClr>
-                <a:schemeClr val="dk1"/>
-              </a:buClr>
-              <a:buSzPct val="100000"/>
-              <a:buNone/>
-            </a:pPr>
             <a:endParaRPr lang="en-US" dirty="0"/>
-          </a:p>
-          <a:p>
-            <a:pPr marL="38100" lvl="0" indent="0">
-              <a:lnSpc>
-                <a:spcPct val="130000"/>
-              </a:lnSpc>
-              <a:buClr>
-                <a:schemeClr val="dk1"/>
-              </a:buClr>
-              <a:buSzPct val="100000"/>
-              <a:buNone/>
-            </a:pPr>
-            <a:r>
-              <a:rPr lang="en-US" sz="2400" dirty="0" smtClean="0"/>
-              <a:t>-nothing happens when you declare a method.</a:t>
-            </a:r>
-          </a:p>
-          <a:p>
-            <a:pPr marL="38100" lvl="0" indent="0">
-              <a:lnSpc>
-                <a:spcPct val="130000"/>
-              </a:lnSpc>
-              <a:buClr>
-                <a:schemeClr val="dk1"/>
-              </a:buClr>
-              <a:buSzPct val="100000"/>
-              <a:buNone/>
-            </a:pPr>
-            <a:r>
-              <a:rPr lang="en-US" sz="2400" dirty="0" smtClean="0"/>
-              <a:t>- you have to call it later to execute it.</a:t>
-            </a:r>
-            <a:endParaRPr lang="en-US" sz="2400" dirty="0"/>
           </a:p>
         </p:txBody>
       </p:sp>
     </p:spTree>
     <p:extLst>
       <p:ext uri="{BB962C8B-B14F-4D97-AF65-F5344CB8AC3E}">
-        <p14:creationId xmlns:p14="http://schemas.microsoft.com/office/powerpoint/2010/main" val="3921077376"/>
+        <p14:creationId xmlns:p14="http://schemas.microsoft.com/office/powerpoint/2010/main" val="1562451193"/>
       </p:ext>
     </p:extLst>
   </p:cSld>
   <p:clrMapOvr>
     <a:masterClrMapping/>
   </p:clrMapOvr>
-  <p:transition spd="slow">
+  <p:transition xmlns:p14="http://schemas.microsoft.com/office/powerpoint/2010/main" spd="slow">
     <p:cut/>
   </p:transition>
   <p:timing>
     <p:tnLst>
       <p:par>
-        <p:cTn id="1" dur="indefinite" restart="never" nodeType="tmRoot"/>
-      </p:par>
-    </p:tnLst>
-  </p:timing>
-</p:sld>
-</file>
-
-<file path=ppt/slides/slide9.xml><?xml version="1.0" encoding="utf-8"?>
-<p:sld xmlns:a="http://schemas.openxmlformats.org/drawingml/2006/main" xmlns:r="http://schemas.openxmlformats.org/officeDocument/2006/relationships" xmlns:p="http://schemas.openxmlformats.org/presentationml/2006/main">
-  <p:cSld>
-    <p:spTree>
-      <p:nvGrpSpPr>
-        <p:cNvPr id="1" name="Shape 28"/>
-        <p:cNvGrpSpPr/>
-        <p:nvPr/>
-      </p:nvGrpSpPr>
-      <p:grpSpPr>
-        <a:xfrm>
-          <a:off x="0" y="0"/>
-          <a:ext cx="0" cy="0"/>
-          <a:chOff x="0" y="0"/>
-          <a:chExt cx="0" cy="0"/>
-        </a:xfrm>
-      </p:grpSpPr>
-      <p:sp>
-        <p:nvSpPr>
-          <p:cNvPr id="29" name="Shape 29"/>
-          <p:cNvSpPr txBox="1">
-            <a:spLocks noGrp="1"/>
-          </p:cNvSpPr>
-          <p:nvPr>
-            <p:ph type="title"/>
-          </p:nvPr>
-        </p:nvSpPr>
-        <p:spPr>
-          <a:xfrm>
-            <a:off x="457200" y="274637"/>
-            <a:ext cx="8229600" cy="1143000"/>
-          </a:xfrm>
-          <a:prstGeom prst="rect">
-            <a:avLst/>
-          </a:prstGeom>
-        </p:spPr>
-        <p:txBody>
-          <a:bodyPr lIns="91425" tIns="91425" rIns="91425" bIns="91425" anchor="b" anchorCtr="0">
-            <a:noAutofit/>
-          </a:bodyPr>
-          <a:lstStyle/>
-          <a:p>
-            <a:pPr>
-              <a:spcBef>
-                <a:spcPts val="0"/>
-              </a:spcBef>
-              <a:buNone/>
-            </a:pPr>
-            <a:r>
-              <a:rPr lang="en-US" sz="7200" dirty="0" smtClean="0">
-                <a:solidFill>
-                  <a:srgbClr val="FF0000"/>
-                </a:solidFill>
-                <a:latin typeface="Yanone Kaffeesatz Bold"/>
-                <a:cs typeface="Yanone Kaffeesatz Bold"/>
-              </a:rPr>
-              <a:t>Plan</a:t>
-            </a:r>
-            <a:endParaRPr lang="en" sz="7200" dirty="0">
-              <a:solidFill>
-                <a:srgbClr val="FF0000"/>
-              </a:solidFill>
-              <a:latin typeface="Yanone Kaffeesatz Bold"/>
-              <a:cs typeface="Yanone Kaffeesatz Bold"/>
-            </a:endParaRPr>
-          </a:p>
-        </p:txBody>
-      </p:sp>
-      <p:sp>
-        <p:nvSpPr>
-          <p:cNvPr id="30" name="Shape 30"/>
-          <p:cNvSpPr txBox="1">
-            <a:spLocks noGrp="1"/>
-          </p:cNvSpPr>
-          <p:nvPr>
-            <p:ph type="body" idx="1"/>
-          </p:nvPr>
-        </p:nvSpPr>
-        <p:spPr>
-          <a:xfrm>
-            <a:off x="457200" y="1600200"/>
-            <a:ext cx="8229600" cy="4967700"/>
-          </a:xfrm>
-          <a:prstGeom prst="rect">
-            <a:avLst/>
-          </a:prstGeom>
-        </p:spPr>
-        <p:txBody>
-          <a:bodyPr lIns="91425" tIns="91425" rIns="91425" bIns="91425" anchor="t" anchorCtr="0">
-            <a:noAutofit/>
-          </a:bodyPr>
-          <a:lstStyle/>
-          <a:p>
-            <a:pPr marL="457200" marR="0" lvl="0" indent="-419100" defTabSz="914400" eaLnBrk="1" fontAlgn="auto" latinLnBrk="0" hangingPunct="1">
-              <a:lnSpc>
-                <a:spcPct val="130000"/>
-              </a:lnSpc>
-              <a:spcBef>
-                <a:spcPts val="0"/>
-              </a:spcBef>
-              <a:spcAft>
-                <a:spcPts val="0"/>
-              </a:spcAft>
-              <a:buClr>
-                <a:schemeClr val="dk1"/>
-              </a:buClr>
-              <a:buSzPct val="100000"/>
-              <a:buFontTx/>
-              <a:buNone/>
-              <a:tabLst/>
-              <a:defRPr/>
-            </a:pPr>
-            <a:r>
-              <a:rPr lang="en-US" dirty="0"/>
-              <a:t>Keep going!</a:t>
-            </a:r>
-          </a:p>
-          <a:p>
-            <a:pPr marL="457200" marR="0" lvl="0" indent="-419100" defTabSz="914400" eaLnBrk="1" fontAlgn="auto" latinLnBrk="0" hangingPunct="1">
-              <a:lnSpc>
-                <a:spcPct val="130000"/>
-              </a:lnSpc>
-              <a:spcBef>
-                <a:spcPts val="0"/>
-              </a:spcBef>
-              <a:spcAft>
-                <a:spcPts val="0"/>
-              </a:spcAft>
-              <a:buClr>
-                <a:schemeClr val="dk1"/>
-              </a:buClr>
-              <a:buSzPct val="100000"/>
-              <a:buFontTx/>
-              <a:buNone/>
-              <a:tabLst/>
-              <a:defRPr/>
-            </a:pPr>
-            <a:endParaRPr lang="en-US" dirty="0"/>
-          </a:p>
-          <a:p>
-            <a:pPr marL="457200" marR="0" lvl="0" indent="-419100" defTabSz="914400" eaLnBrk="1" fontAlgn="auto" latinLnBrk="0" hangingPunct="1">
-              <a:lnSpc>
-                <a:spcPct val="130000"/>
-              </a:lnSpc>
-              <a:spcBef>
-                <a:spcPts val="0"/>
-              </a:spcBef>
-              <a:spcAft>
-                <a:spcPts val="0"/>
-              </a:spcAft>
-              <a:buClr>
-                <a:schemeClr val="dk1"/>
-              </a:buClr>
-              <a:buSzPct val="100000"/>
-              <a:buFontTx/>
-              <a:buNone/>
-              <a:tabLst/>
-              <a:defRPr/>
-            </a:pPr>
-            <a:r>
-              <a:rPr lang="en-US" dirty="0"/>
-              <a:t>But we take requests!</a:t>
-            </a:r>
-          </a:p>
-        </p:txBody>
-      </p:sp>
-    </p:spTree>
-    <p:extLst>
-      <p:ext uri="{BB962C8B-B14F-4D97-AF65-F5344CB8AC3E}">
-        <p14:creationId xmlns:p14="http://schemas.microsoft.com/office/powerpoint/2010/main" val="918242060"/>
-      </p:ext>
-    </p:extLst>
-  </p:cSld>
-  <p:clrMapOvr>
-    <a:masterClrMapping/>
-  </p:clrMapOvr>
-  <p:transition spd="slow">
-    <p:cut/>
-  </p:transition>
-  <p:timing>
-    <p:tnLst>
-      <p:par>
-        <p:cTn id="1" dur="indefinite" restart="never" nodeType="tmRoot"/>
+        <p:cTn xmlns:p14="http://schemas.microsoft.com/office/powerpoint/2010/main" id="1" dur="indefinite" restart="never" nodeType="tmRoot"/>
       </p:par>
     </p:tnLst>
   </p:timing>

</xml_diff>